<commit_message>
Pre-pull commit, will be adding new documentation to docs directory.
</commit_message>
<xml_diff>
--- a/edu.csbsju.whats-happenin-cs330/docs/UMLPresentation.pptx
+++ b/edu.csbsju.whats-happenin-cs330/docs/UMLPresentation.pptx
@@ -8,11 +8,14 @@
     <p:sldId id="256" r:id="rId2"/>
     <p:sldId id="257" r:id="rId3"/>
     <p:sldId id="258" r:id="rId4"/>
-    <p:sldId id="259" r:id="rId5"/>
-    <p:sldId id="260" r:id="rId6"/>
-    <p:sldId id="261" r:id="rId7"/>
-    <p:sldId id="262" r:id="rId8"/>
-    <p:sldId id="263" r:id="rId9"/>
+    <p:sldId id="267" r:id="rId5"/>
+    <p:sldId id="259" r:id="rId6"/>
+    <p:sldId id="260" r:id="rId7"/>
+    <p:sldId id="261" r:id="rId8"/>
+    <p:sldId id="262" r:id="rId9"/>
+    <p:sldId id="264" r:id="rId10"/>
+    <p:sldId id="266" r:id="rId11"/>
+    <p:sldId id="263" r:id="rId12"/>
   </p:sldIdLst>
   <p:sldSz cx="9144000" cy="6858000" type="screen4x3"/>
   <p:notesSz cx="6858000" cy="9144000"/>
@@ -300,7 +303,7 @@
             <a:fld id="{8E36636D-D922-432D-A958-524484B5923D}" type="datetimeFigureOut">
               <a:rPr lang="en-US" smtClean="0"/>
               <a:pPr/>
-              <a:t>11/6/2012</a:t>
+              <a:t>12/5/2012</a:t>
             </a:fld>
             <a:endParaRPr lang="en-US"/>
           </a:p>
@@ -467,7 +470,7 @@
             <a:fld id="{8E36636D-D922-432D-A958-524484B5923D}" type="datetimeFigureOut">
               <a:rPr lang="en-US" smtClean="0"/>
               <a:pPr/>
-              <a:t>11/6/2012</a:t>
+              <a:t>12/5/2012</a:t>
             </a:fld>
             <a:endParaRPr lang="en-US"/>
           </a:p>
@@ -644,7 +647,7 @@
             <a:fld id="{8E36636D-D922-432D-A958-524484B5923D}" type="datetimeFigureOut">
               <a:rPr lang="en-US" smtClean="0"/>
               <a:pPr/>
-              <a:t>11/6/2012</a:t>
+              <a:t>12/5/2012</a:t>
             </a:fld>
             <a:endParaRPr lang="en-US"/>
           </a:p>
@@ -811,7 +814,7 @@
             <a:fld id="{8E36636D-D922-432D-A958-524484B5923D}" type="datetimeFigureOut">
               <a:rPr lang="en-US" smtClean="0"/>
               <a:pPr/>
-              <a:t>11/6/2012</a:t>
+              <a:t>12/5/2012</a:t>
             </a:fld>
             <a:endParaRPr lang="en-US"/>
           </a:p>
@@ -1052,7 +1055,7 @@
             <a:fld id="{8E36636D-D922-432D-A958-524484B5923D}" type="datetimeFigureOut">
               <a:rPr lang="en-US" smtClean="0"/>
               <a:pPr/>
-              <a:t>11/6/2012</a:t>
+              <a:t>12/5/2012</a:t>
             </a:fld>
             <a:endParaRPr lang="en-US"/>
           </a:p>
@@ -1337,7 +1340,7 @@
             <a:fld id="{8E36636D-D922-432D-A958-524484B5923D}" type="datetimeFigureOut">
               <a:rPr lang="en-US" smtClean="0"/>
               <a:pPr/>
-              <a:t>11/6/2012</a:t>
+              <a:t>12/5/2012</a:t>
             </a:fld>
             <a:endParaRPr lang="en-US"/>
           </a:p>
@@ -1756,7 +1759,7 @@
             <a:fld id="{8E36636D-D922-432D-A958-524484B5923D}" type="datetimeFigureOut">
               <a:rPr lang="en-US" smtClean="0"/>
               <a:pPr/>
-              <a:t>11/6/2012</a:t>
+              <a:t>12/5/2012</a:t>
             </a:fld>
             <a:endParaRPr lang="en-US"/>
           </a:p>
@@ -1871,7 +1874,7 @@
             <a:fld id="{8E36636D-D922-432D-A958-524484B5923D}" type="datetimeFigureOut">
               <a:rPr lang="en-US" smtClean="0"/>
               <a:pPr/>
-              <a:t>11/6/2012</a:t>
+              <a:t>12/5/2012</a:t>
             </a:fld>
             <a:endParaRPr lang="en-US"/>
           </a:p>
@@ -1963,7 +1966,7 @@
             <a:fld id="{8E36636D-D922-432D-A958-524484B5923D}" type="datetimeFigureOut">
               <a:rPr lang="en-US" smtClean="0"/>
               <a:pPr/>
-              <a:t>11/6/2012</a:t>
+              <a:t>12/5/2012</a:t>
             </a:fld>
             <a:endParaRPr lang="en-US"/>
           </a:p>
@@ -2244,7 +2247,7 @@
             <a:fld id="{8E36636D-D922-432D-A958-524484B5923D}" type="datetimeFigureOut">
               <a:rPr lang="en-US" smtClean="0"/>
               <a:pPr/>
-              <a:t>11/6/2012</a:t>
+              <a:t>12/5/2012</a:t>
             </a:fld>
             <a:endParaRPr lang="en-US"/>
           </a:p>
@@ -2505,7 +2508,7 @@
             <a:fld id="{8E36636D-D922-432D-A958-524484B5923D}" type="datetimeFigureOut">
               <a:rPr lang="en-US" smtClean="0"/>
               <a:pPr/>
-              <a:t>11/6/2012</a:t>
+              <a:t>12/5/2012</a:t>
             </a:fld>
             <a:endParaRPr lang="en-US"/>
           </a:p>
@@ -2715,7 +2718,7 @@
             <a:fld id="{8E36636D-D922-432D-A958-524484B5923D}" type="datetimeFigureOut">
               <a:rPr lang="en-US" smtClean="0"/>
               <a:pPr/>
-              <a:t>11/6/2012</a:t>
+              <a:t>12/5/2012</a:t>
             </a:fld>
             <a:endParaRPr lang="en-US"/>
           </a:p>
@@ -3223,6 +3226,635 @@
 </p:sld>
 </file>
 
+<file path=ppt/slides/slide10.xml><?xml version="1.0" encoding="utf-8"?>
+<p:sld xmlns:a="http://schemas.openxmlformats.org/drawingml/2006/main" xmlns:r="http://schemas.openxmlformats.org/officeDocument/2006/relationships" xmlns:p="http://schemas.openxmlformats.org/presentationml/2006/main">
+  <p:cSld>
+    <p:spTree>
+      <p:nvGrpSpPr>
+        <p:cNvPr id="1" name=""/>
+        <p:cNvGrpSpPr/>
+        <p:nvPr/>
+      </p:nvGrpSpPr>
+      <p:grpSpPr>
+        <a:xfrm>
+          <a:off x="0" y="0"/>
+          <a:ext cx="0" cy="0"/>
+          <a:chOff x="0" y="0"/>
+          <a:chExt cx="0" cy="0"/>
+        </a:xfrm>
+      </p:grpSpPr>
+      <p:sp>
+        <p:nvSpPr>
+          <p:cNvPr id="2" name="Title 1"/>
+          <p:cNvSpPr>
+            <a:spLocks noGrp="1"/>
+          </p:cNvSpPr>
+          <p:nvPr>
+            <p:ph type="title"/>
+          </p:nvPr>
+        </p:nvSpPr>
+        <p:spPr>
+          <a:xfrm>
+            <a:off x="163774" y="329236"/>
+            <a:ext cx="8980226" cy="776233"/>
+          </a:xfrm>
+        </p:spPr>
+        <p:txBody>
+          <a:bodyPr>
+            <a:noAutofit/>
+          </a:bodyPr>
+          <a:lstStyle/>
+          <a:p>
+            <a:r>
+              <a:rPr lang="en-US" sz="4000" dirty="0" smtClean="0"/>
+              <a:t>View Comments</a:t>
+            </a:r>
+            <a:endParaRPr lang="en-US" sz="4000" dirty="0"/>
+          </a:p>
+        </p:txBody>
+      </p:sp>
+      <p:sp>
+        <p:nvSpPr>
+          <p:cNvPr id="4" name="Rectangle 3"/>
+          <p:cNvSpPr/>
+          <p:nvPr/>
+        </p:nvSpPr>
+        <p:spPr>
+          <a:xfrm>
+            <a:off x="1849567" y="1802167"/>
+            <a:ext cx="656947" cy="4296792"/>
+          </a:xfrm>
+          <a:prstGeom prst="rect">
+            <a:avLst/>
+          </a:prstGeom>
+        </p:spPr>
+        <p:style>
+          <a:lnRef idx="2">
+            <a:schemeClr val="accent1">
+              <a:shade val="50000"/>
+            </a:schemeClr>
+          </a:lnRef>
+          <a:fillRef idx="1">
+            <a:schemeClr val="accent1"/>
+          </a:fillRef>
+          <a:effectRef idx="0">
+            <a:schemeClr val="accent1"/>
+          </a:effectRef>
+          <a:fontRef idx="minor">
+            <a:schemeClr val="lt1"/>
+          </a:fontRef>
+        </p:style>
+        <p:txBody>
+          <a:bodyPr rtlCol="0" anchor="ctr"/>
+          <a:lstStyle/>
+          <a:p>
+            <a:pPr algn="ctr"/>
+            <a:endParaRPr lang="en-US"/>
+          </a:p>
+        </p:txBody>
+      </p:sp>
+      <p:sp>
+        <p:nvSpPr>
+          <p:cNvPr id="5" name="Rectangle 4"/>
+          <p:cNvSpPr/>
+          <p:nvPr/>
+        </p:nvSpPr>
+        <p:spPr>
+          <a:xfrm>
+            <a:off x="4475825" y="1802167"/>
+            <a:ext cx="656947" cy="4296792"/>
+          </a:xfrm>
+          <a:prstGeom prst="rect">
+            <a:avLst/>
+          </a:prstGeom>
+        </p:spPr>
+        <p:style>
+          <a:lnRef idx="2">
+            <a:schemeClr val="accent1">
+              <a:shade val="50000"/>
+            </a:schemeClr>
+          </a:lnRef>
+          <a:fillRef idx="1">
+            <a:schemeClr val="accent1"/>
+          </a:fillRef>
+          <a:effectRef idx="0">
+            <a:schemeClr val="accent1"/>
+          </a:effectRef>
+          <a:fontRef idx="minor">
+            <a:schemeClr val="lt1"/>
+          </a:fontRef>
+        </p:style>
+        <p:txBody>
+          <a:bodyPr rtlCol="0" anchor="ctr"/>
+          <a:lstStyle/>
+          <a:p>
+            <a:pPr algn="ctr"/>
+            <a:endParaRPr lang="en-US"/>
+          </a:p>
+        </p:txBody>
+      </p:sp>
+      <p:sp>
+        <p:nvSpPr>
+          <p:cNvPr id="6" name="Rectangle 5"/>
+          <p:cNvSpPr/>
+          <p:nvPr/>
+        </p:nvSpPr>
+        <p:spPr>
+          <a:xfrm>
+            <a:off x="7344792" y="1802167"/>
+            <a:ext cx="656947" cy="4296792"/>
+          </a:xfrm>
+          <a:prstGeom prst="rect">
+            <a:avLst/>
+          </a:prstGeom>
+        </p:spPr>
+        <p:style>
+          <a:lnRef idx="2">
+            <a:schemeClr val="accent1">
+              <a:shade val="50000"/>
+            </a:schemeClr>
+          </a:lnRef>
+          <a:fillRef idx="1">
+            <a:schemeClr val="accent1"/>
+          </a:fillRef>
+          <a:effectRef idx="0">
+            <a:schemeClr val="accent1"/>
+          </a:effectRef>
+          <a:fontRef idx="minor">
+            <a:schemeClr val="lt1"/>
+          </a:fontRef>
+        </p:style>
+        <p:txBody>
+          <a:bodyPr rtlCol="0" anchor="ctr"/>
+          <a:lstStyle/>
+          <a:p>
+            <a:pPr algn="ctr"/>
+            <a:endParaRPr lang="en-US"/>
+          </a:p>
+        </p:txBody>
+      </p:sp>
+      <p:sp>
+        <p:nvSpPr>
+          <p:cNvPr id="7" name="TextBox 6"/>
+          <p:cNvSpPr txBox="1"/>
+          <p:nvPr/>
+        </p:nvSpPr>
+        <p:spPr>
+          <a:xfrm>
+            <a:off x="1890942" y="1349406"/>
+            <a:ext cx="625492" cy="369332"/>
+          </a:xfrm>
+          <a:prstGeom prst="rect">
+            <a:avLst/>
+          </a:prstGeom>
+          <a:noFill/>
+        </p:spPr>
+        <p:txBody>
+          <a:bodyPr wrap="none" rtlCol="0">
+            <a:spAutoFit/>
+          </a:bodyPr>
+          <a:lstStyle/>
+          <a:p>
+            <a:r>
+              <a:rPr lang="en-US" dirty="0" smtClean="0"/>
+              <a:t>User</a:t>
+            </a:r>
+            <a:endParaRPr lang="en-US" dirty="0"/>
+          </a:p>
+        </p:txBody>
+      </p:sp>
+      <p:sp>
+        <p:nvSpPr>
+          <p:cNvPr id="8" name="TextBox 7"/>
+          <p:cNvSpPr txBox="1"/>
+          <p:nvPr/>
+        </p:nvSpPr>
+        <p:spPr>
+          <a:xfrm>
+            <a:off x="4517201" y="1349406"/>
+            <a:ext cx="574196" cy="369332"/>
+          </a:xfrm>
+          <a:prstGeom prst="rect">
+            <a:avLst/>
+          </a:prstGeom>
+          <a:noFill/>
+        </p:spPr>
+        <p:txBody>
+          <a:bodyPr wrap="none" rtlCol="0">
+            <a:spAutoFit/>
+          </a:bodyPr>
+          <a:lstStyle/>
+          <a:p>
+            <a:pPr algn="ctr"/>
+            <a:r>
+              <a:rPr lang="en-US" dirty="0" smtClean="0"/>
+              <a:t>App</a:t>
+            </a:r>
+            <a:endParaRPr lang="en-US" dirty="0"/>
+          </a:p>
+        </p:txBody>
+      </p:sp>
+      <p:sp>
+        <p:nvSpPr>
+          <p:cNvPr id="9" name="TextBox 8"/>
+          <p:cNvSpPr txBox="1"/>
+          <p:nvPr/>
+        </p:nvSpPr>
+        <p:spPr>
+          <a:xfrm>
+            <a:off x="7435059" y="1317140"/>
+            <a:ext cx="476413" cy="369332"/>
+          </a:xfrm>
+          <a:prstGeom prst="rect">
+            <a:avLst/>
+          </a:prstGeom>
+          <a:noFill/>
+        </p:spPr>
+        <p:txBody>
+          <a:bodyPr wrap="none" rtlCol="0">
+            <a:spAutoFit/>
+          </a:bodyPr>
+          <a:lstStyle/>
+          <a:p>
+            <a:pPr algn="ctr"/>
+            <a:r>
+              <a:rPr lang="en-US" dirty="0" smtClean="0"/>
+              <a:t>DB</a:t>
+            </a:r>
+            <a:endParaRPr lang="en-US" dirty="0"/>
+          </a:p>
+        </p:txBody>
+      </p:sp>
+      <p:cxnSp>
+        <p:nvCxnSpPr>
+          <p:cNvPr id="11" name="Straight Arrow Connector 10"/>
+          <p:cNvCxnSpPr/>
+          <p:nvPr/>
+        </p:nvCxnSpPr>
+        <p:spPr>
+          <a:xfrm>
+            <a:off x="2516434" y="3096421"/>
+            <a:ext cx="1969311" cy="0"/>
+          </a:xfrm>
+          <a:prstGeom prst="straightConnector1">
+            <a:avLst/>
+          </a:prstGeom>
+          <a:ln>
+            <a:tailEnd type="arrow"/>
+          </a:ln>
+        </p:spPr>
+        <p:style>
+          <a:lnRef idx="1">
+            <a:schemeClr val="accent1"/>
+          </a:lnRef>
+          <a:fillRef idx="0">
+            <a:schemeClr val="accent1"/>
+          </a:fillRef>
+          <a:effectRef idx="0">
+            <a:schemeClr val="accent1"/>
+          </a:effectRef>
+          <a:fontRef idx="minor">
+            <a:schemeClr val="tx1"/>
+          </a:fontRef>
+        </p:style>
+      </p:cxnSp>
+      <p:sp>
+        <p:nvSpPr>
+          <p:cNvPr id="40" name="TextBox 39"/>
+          <p:cNvSpPr txBox="1"/>
+          <p:nvPr/>
+        </p:nvSpPr>
+        <p:spPr>
+          <a:xfrm>
+            <a:off x="2534705" y="2654017"/>
+            <a:ext cx="1969835" cy="307777"/>
+          </a:xfrm>
+          <a:prstGeom prst="rect">
+            <a:avLst/>
+          </a:prstGeom>
+          <a:noFill/>
+        </p:spPr>
+        <p:txBody>
+          <a:bodyPr wrap="none" rtlCol="0">
+            <a:spAutoFit/>
+          </a:bodyPr>
+          <a:lstStyle/>
+          <a:p>
+            <a:r>
+              <a:rPr lang="en-US" sz="1400" dirty="0" smtClean="0"/>
+              <a:t>Press “View Comments”</a:t>
+            </a:r>
+            <a:endParaRPr lang="en-US" sz="1400" dirty="0"/>
+          </a:p>
+        </p:txBody>
+      </p:sp>
+      <p:cxnSp>
+        <p:nvCxnSpPr>
+          <p:cNvPr id="44" name="Straight Arrow Connector 43"/>
+          <p:cNvCxnSpPr/>
+          <p:nvPr/>
+        </p:nvCxnSpPr>
+        <p:spPr>
+          <a:xfrm>
+            <a:off x="5123894" y="3244400"/>
+            <a:ext cx="2212020" cy="0"/>
+          </a:xfrm>
+          <a:prstGeom prst="straightConnector1">
+            <a:avLst/>
+          </a:prstGeom>
+          <a:ln>
+            <a:tailEnd type="arrow"/>
+          </a:ln>
+        </p:spPr>
+        <p:style>
+          <a:lnRef idx="1">
+            <a:schemeClr val="accent1"/>
+          </a:lnRef>
+          <a:fillRef idx="0">
+            <a:schemeClr val="accent1"/>
+          </a:fillRef>
+          <a:effectRef idx="0">
+            <a:schemeClr val="accent1"/>
+          </a:effectRef>
+          <a:fontRef idx="minor">
+            <a:schemeClr val="tx1"/>
+          </a:fontRef>
+        </p:style>
+      </p:cxnSp>
+      <p:sp>
+        <p:nvSpPr>
+          <p:cNvPr id="47" name="TextBox 46"/>
+          <p:cNvSpPr txBox="1"/>
+          <p:nvPr/>
+        </p:nvSpPr>
+        <p:spPr>
+          <a:xfrm>
+            <a:off x="5279384" y="2654017"/>
+            <a:ext cx="1671355" cy="523220"/>
+          </a:xfrm>
+          <a:prstGeom prst="rect">
+            <a:avLst/>
+          </a:prstGeom>
+          <a:noFill/>
+        </p:spPr>
+        <p:txBody>
+          <a:bodyPr wrap="none" rtlCol="0">
+            <a:spAutoFit/>
+          </a:bodyPr>
+          <a:lstStyle/>
+          <a:p>
+            <a:r>
+              <a:rPr lang="en-US" sz="1400" dirty="0" smtClean="0"/>
+              <a:t>Request Comments </a:t>
+            </a:r>
+          </a:p>
+          <a:p>
+            <a:pPr algn="ctr"/>
+            <a:r>
+              <a:rPr lang="en-US" sz="1400" dirty="0" smtClean="0"/>
+              <a:t>for </a:t>
+            </a:r>
+            <a:r>
+              <a:rPr lang="en-US" sz="1400" dirty="0" err="1" smtClean="0"/>
+              <a:t>Happenin</a:t>
+            </a:r>
+            <a:endParaRPr lang="en-US" sz="1400" dirty="0"/>
+          </a:p>
+        </p:txBody>
+      </p:sp>
+      <p:cxnSp>
+        <p:nvCxnSpPr>
+          <p:cNvPr id="48" name="Straight Arrow Connector 47"/>
+          <p:cNvCxnSpPr/>
+          <p:nvPr/>
+        </p:nvCxnSpPr>
+        <p:spPr>
+          <a:xfrm flipH="1">
+            <a:off x="5132773" y="3710460"/>
+            <a:ext cx="2212019" cy="1"/>
+          </a:xfrm>
+          <a:prstGeom prst="straightConnector1">
+            <a:avLst/>
+          </a:prstGeom>
+          <a:ln>
+            <a:tailEnd type="arrow"/>
+          </a:ln>
+        </p:spPr>
+        <p:style>
+          <a:lnRef idx="1">
+            <a:schemeClr val="accent1"/>
+          </a:lnRef>
+          <a:fillRef idx="0">
+            <a:schemeClr val="accent1"/>
+          </a:fillRef>
+          <a:effectRef idx="0">
+            <a:schemeClr val="accent1"/>
+          </a:effectRef>
+          <a:fontRef idx="minor">
+            <a:schemeClr val="tx1"/>
+          </a:fontRef>
+        </p:style>
+      </p:cxnSp>
+      <p:sp>
+        <p:nvSpPr>
+          <p:cNvPr id="50" name="TextBox 49"/>
+          <p:cNvSpPr txBox="1"/>
+          <p:nvPr/>
+        </p:nvSpPr>
+        <p:spPr>
+          <a:xfrm>
+            <a:off x="5382556" y="3402683"/>
+            <a:ext cx="1839671" cy="307777"/>
+          </a:xfrm>
+          <a:prstGeom prst="rect">
+            <a:avLst/>
+          </a:prstGeom>
+          <a:noFill/>
+        </p:spPr>
+        <p:txBody>
+          <a:bodyPr wrap="none" rtlCol="0">
+            <a:spAutoFit/>
+          </a:bodyPr>
+          <a:lstStyle/>
+          <a:p>
+            <a:r>
+              <a:rPr lang="en-US" sz="1400" dirty="0" smtClean="0"/>
+              <a:t>Return Comments List</a:t>
+            </a:r>
+            <a:endParaRPr lang="en-US" sz="1400" dirty="0"/>
+          </a:p>
+        </p:txBody>
+      </p:sp>
+      <p:cxnSp>
+        <p:nvCxnSpPr>
+          <p:cNvPr id="51" name="Straight Arrow Connector 50"/>
+          <p:cNvCxnSpPr/>
+          <p:nvPr/>
+        </p:nvCxnSpPr>
+        <p:spPr>
+          <a:xfrm flipH="1" flipV="1">
+            <a:off x="2506513" y="3889340"/>
+            <a:ext cx="1969311" cy="17755"/>
+          </a:xfrm>
+          <a:prstGeom prst="straightConnector1">
+            <a:avLst/>
+          </a:prstGeom>
+          <a:ln>
+            <a:tailEnd type="arrow"/>
+          </a:ln>
+        </p:spPr>
+        <p:style>
+          <a:lnRef idx="1">
+            <a:schemeClr val="accent1"/>
+          </a:lnRef>
+          <a:fillRef idx="0">
+            <a:schemeClr val="accent1"/>
+          </a:fillRef>
+          <a:effectRef idx="0">
+            <a:schemeClr val="accent1"/>
+          </a:effectRef>
+          <a:fontRef idx="minor">
+            <a:schemeClr val="tx1"/>
+          </a:fontRef>
+        </p:style>
+      </p:cxnSp>
+      <p:sp>
+        <p:nvSpPr>
+          <p:cNvPr id="52" name="TextBox 51"/>
+          <p:cNvSpPr txBox="1"/>
+          <p:nvPr/>
+        </p:nvSpPr>
+        <p:spPr>
+          <a:xfrm>
+            <a:off x="2534705" y="3556914"/>
+            <a:ext cx="1941119" cy="307777"/>
+          </a:xfrm>
+          <a:prstGeom prst="rect">
+            <a:avLst/>
+          </a:prstGeom>
+          <a:noFill/>
+        </p:spPr>
+        <p:txBody>
+          <a:bodyPr wrap="square" rtlCol="0">
+            <a:spAutoFit/>
+          </a:bodyPr>
+          <a:lstStyle/>
+          <a:p>
+            <a:pPr algn="ctr"/>
+            <a:r>
+              <a:rPr lang="en-US" sz="1400" dirty="0" smtClean="0"/>
+              <a:t>Display Comments</a:t>
+            </a:r>
+            <a:endParaRPr lang="en-US" sz="1400" dirty="0"/>
+          </a:p>
+        </p:txBody>
+      </p:sp>
+    </p:spTree>
+    <p:extLst>
+      <p:ext uri="{BB962C8B-B14F-4D97-AF65-F5344CB8AC3E}">
+        <p14:creationId xmlns:p14="http://schemas.microsoft.com/office/powerpoint/2010/main" val="2607719460"/>
+      </p:ext>
+    </p:extLst>
+  </p:cSld>
+  <p:clrMapOvr>
+    <a:masterClrMapping/>
+  </p:clrMapOvr>
+  <p:timing>
+    <p:tnLst>
+      <p:par>
+        <p:cTn id="1" dur="indefinite" restart="never" nodeType="tmRoot"/>
+      </p:par>
+    </p:tnLst>
+  </p:timing>
+</p:sld>
+</file>
+
+<file path=ppt/slides/slide11.xml><?xml version="1.0" encoding="utf-8"?>
+<p:sld xmlns:a="http://schemas.openxmlformats.org/drawingml/2006/main" xmlns:r="http://schemas.openxmlformats.org/officeDocument/2006/relationships" xmlns:p="http://schemas.openxmlformats.org/presentationml/2006/main">
+  <p:cSld>
+    <p:spTree>
+      <p:nvGrpSpPr>
+        <p:cNvPr id="1" name=""/>
+        <p:cNvGrpSpPr/>
+        <p:nvPr/>
+      </p:nvGrpSpPr>
+      <p:grpSpPr>
+        <a:xfrm>
+          <a:off x="0" y="0"/>
+          <a:ext cx="0" cy="0"/>
+          <a:chOff x="0" y="0"/>
+          <a:chExt cx="0" cy="0"/>
+        </a:xfrm>
+      </p:grpSpPr>
+      <p:sp>
+        <p:nvSpPr>
+          <p:cNvPr id="2" name="Title 1"/>
+          <p:cNvSpPr>
+            <a:spLocks noGrp="1"/>
+          </p:cNvSpPr>
+          <p:nvPr>
+            <p:ph type="title"/>
+          </p:nvPr>
+        </p:nvSpPr>
+        <p:spPr/>
+        <p:txBody>
+          <a:bodyPr/>
+          <a:lstStyle/>
+          <a:p>
+            <a:endParaRPr lang="en-US" dirty="0"/>
+          </a:p>
+        </p:txBody>
+      </p:sp>
+      <p:sp>
+        <p:nvSpPr>
+          <p:cNvPr id="4" name="Text Placeholder 3"/>
+          <p:cNvSpPr>
+            <a:spLocks noGrp="1"/>
+          </p:cNvSpPr>
+          <p:nvPr>
+            <p:ph type="body" idx="1"/>
+          </p:nvPr>
+        </p:nvSpPr>
+        <p:spPr>
+          <a:xfrm>
+            <a:off x="722313" y="2325951"/>
+            <a:ext cx="7772400" cy="1216240"/>
+          </a:xfrm>
+        </p:spPr>
+        <p:txBody>
+          <a:bodyPr>
+            <a:normAutofit/>
+          </a:bodyPr>
+          <a:lstStyle/>
+          <a:p>
+            <a:r>
+              <a:rPr lang="en-US" sz="4000" b="1" dirty="0" smtClean="0"/>
+              <a:t>QUESTIONS?</a:t>
+            </a:r>
+            <a:endParaRPr lang="en-US" sz="4000" b="1" dirty="0"/>
+          </a:p>
+        </p:txBody>
+      </p:sp>
+    </p:spTree>
+    <p:extLst>
+      <p:ext uri="{BB962C8B-B14F-4D97-AF65-F5344CB8AC3E}">
+        <p14:creationId xmlns:p14="http://schemas.microsoft.com/office/powerpoint/2010/main" val="2917949882"/>
+      </p:ext>
+    </p:extLst>
+  </p:cSld>
+  <p:clrMapOvr>
+    <a:masterClrMapping/>
+  </p:clrMapOvr>
+  <p:timing>
+    <p:tnLst>
+      <p:par>
+        <p:cTn id="1" dur="indefinite" restart="never" nodeType="tmRoot"/>
+      </p:par>
+    </p:tnLst>
+  </p:timing>
+</p:sld>
+</file>
+
 <file path=ppt/slides/slide2.xml><?xml version="1.0" encoding="utf-8"?>
 <p:sld xmlns:a="http://schemas.openxmlformats.org/drawingml/2006/main" xmlns:r="http://schemas.openxmlformats.org/officeDocument/2006/relationships" xmlns:p="http://schemas.openxmlformats.org/presentationml/2006/main">
   <p:cSld>
@@ -3642,7 +4274,7 @@
         </p:nvSpPr>
         <p:spPr>
           <a:xfrm>
-            <a:off x="474353" y="1600200"/>
+            <a:off x="474353" y="1482375"/>
             <a:ext cx="2569934" cy="2308324"/>
           </a:xfrm>
           <a:prstGeom prst="rect">
@@ -3749,8 +4381,17 @@
             </a:r>
             <a:r>
               <a:rPr lang="en-US" sz="1200" dirty="0" smtClean="0"/>
-              <a:t>&lt;Rank&gt; : ranks</a:t>
-            </a:r>
+              <a:t>&lt;Rating&gt; </a:t>
+            </a:r>
+            <a:r>
+              <a:rPr lang="en-US" sz="1200" dirty="0" smtClean="0"/>
+              <a:t>: </a:t>
+            </a:r>
+            <a:r>
+              <a:rPr lang="en-US" sz="1200" dirty="0" smtClean="0"/>
+              <a:t>ratings</a:t>
+            </a:r>
+            <a:endParaRPr lang="en-US" sz="1200" dirty="0" smtClean="0"/>
           </a:p>
           <a:p>
             <a:pPr marL="285750" indent="-285750">
@@ -3803,7 +4444,7 @@
         </p:nvSpPr>
         <p:spPr>
           <a:xfrm>
-            <a:off x="6184480" y="1969532"/>
+            <a:off x="6184480" y="1851707"/>
             <a:ext cx="2416046" cy="1569660"/>
           </a:xfrm>
           <a:prstGeom prst="rect">
@@ -3878,7 +4519,15 @@
             <a:pPr algn="ctr"/>
             <a:r>
               <a:rPr lang="en-US" sz="1200" dirty="0" smtClean="0"/>
-              <a:t>- Rank : rank</a:t>
+              <a:t>- </a:t>
+            </a:r>
+            <a:r>
+              <a:rPr lang="en-US" sz="1200" dirty="0" smtClean="0"/>
+              <a:t>Rating </a:t>
+            </a:r>
+            <a:r>
+              <a:rPr lang="en-US" sz="1200" dirty="0" smtClean="0"/>
+              <a:t>: rank</a:t>
             </a:r>
           </a:p>
           <a:p>
@@ -3906,7 +4555,7 @@
         </p:nvSpPr>
         <p:spPr>
           <a:xfrm>
-            <a:off x="3145429" y="2267205"/>
+            <a:off x="3145429" y="2149380"/>
             <a:ext cx="288135" cy="369332"/>
           </a:xfrm>
           <a:prstGeom prst="rect">
@@ -3935,7 +4584,7 @@
         </p:nvSpPr>
         <p:spPr>
           <a:xfrm>
-            <a:off x="5813862" y="2267205"/>
+            <a:off x="5813862" y="2149380"/>
             <a:ext cx="306394" cy="369332"/>
           </a:xfrm>
           <a:prstGeom prst="rect">
@@ -3965,8 +4614,8 @@
         </p:nvSpPr>
         <p:spPr>
           <a:xfrm>
-            <a:off x="902542" y="4878646"/>
-            <a:ext cx="1713555" cy="1754327"/>
+            <a:off x="892548" y="4616533"/>
+            <a:ext cx="1723549" cy="1938992"/>
           </a:xfrm>
           <a:prstGeom prst="rect">
             <a:avLst/>
@@ -4042,10 +4691,28 @@
             </a:r>
           </a:p>
           <a:p>
+            <a:pPr marL="171450" indent="-171450" algn="ctr">
+              <a:buFontTx/>
+              <a:buChar char="-"/>
+            </a:pPr>
+            <a:r>
+              <a:rPr lang="en-US" sz="1200" dirty="0" smtClean="0"/>
+              <a:t>String : name</a:t>
+            </a:r>
+          </a:p>
+          <a:p>
             <a:pPr algn="ctr"/>
             <a:r>
               <a:rPr lang="en-US" sz="1200" dirty="0" smtClean="0"/>
-              <a:t>- String : name</a:t>
+              <a:t>+ </a:t>
+            </a:r>
+            <a:r>
+              <a:rPr lang="en-US" sz="1200" dirty="0" err="1" smtClean="0"/>
+              <a:t>enum</a:t>
+            </a:r>
+            <a:r>
+              <a:rPr lang="en-US" sz="1200" dirty="0" smtClean="0"/>
+              <a:t> : Status</a:t>
             </a:r>
           </a:p>
           <a:p>
@@ -4073,7 +4740,7 @@
         </p:nvSpPr>
         <p:spPr>
           <a:xfrm>
-            <a:off x="1364998" y="3934289"/>
+            <a:off x="1364998" y="3816464"/>
             <a:ext cx="306394" cy="369332"/>
           </a:xfrm>
           <a:prstGeom prst="rect">
@@ -4103,8 +4770,8 @@
         </p:nvSpPr>
         <p:spPr>
           <a:xfrm>
-            <a:off x="6184480" y="5146404"/>
-            <a:ext cx="2502320" cy="1200329"/>
+            <a:off x="6141343" y="4783995"/>
+            <a:ext cx="2502320" cy="1569660"/>
           </a:xfrm>
           <a:prstGeom prst="rect">
             <a:avLst/>
@@ -4125,8 +4792,9 @@
             <a:pPr algn="ctr"/>
             <a:r>
               <a:rPr lang="en-US" sz="1200" dirty="0" smtClean="0"/>
-              <a:t>Rank</a:t>
-            </a:r>
+              <a:t>Rating</a:t>
+            </a:r>
+            <a:endParaRPr lang="en-US" sz="1200" dirty="0" smtClean="0"/>
           </a:p>
           <a:p>
             <a:pPr algn="ctr"/>
@@ -4150,22 +4818,48 @@
             </a:r>
           </a:p>
           <a:p>
-            <a:pPr algn="ctr"/>
-            <a:r>
-              <a:rPr lang="en-US" sz="1200" dirty="0" smtClean="0"/>
-              <a:t>- </a:t>
-            </a:r>
+            <a:pPr marL="171450" indent="-171450" algn="ctr">
+              <a:buFontTx/>
+              <a:buChar char="-"/>
+            </a:pPr>
             <a:r>
               <a:rPr lang="en-US" sz="1200" dirty="0" err="1" smtClean="0"/>
               <a:t>DateTime</a:t>
             </a:r>
             <a:r>
               <a:rPr lang="en-US" sz="1200" dirty="0" smtClean="0"/>
-              <a:t> : </a:t>
+              <a:t> </a:t>
+            </a:r>
+            <a:r>
+              <a:rPr lang="en-US" sz="1200" dirty="0" smtClean="0"/>
+              <a:t>: </a:t>
             </a:r>
             <a:r>
               <a:rPr lang="en-US" sz="1200" dirty="0" err="1" smtClean="0"/>
               <a:t>dateTimeOfComment</a:t>
+            </a:r>
+            <a:endParaRPr lang="en-US" sz="1200" dirty="0" smtClean="0"/>
+          </a:p>
+          <a:p>
+            <a:pPr marL="171450" indent="-171450" algn="ctr">
+              <a:buFontTx/>
+              <a:buChar char="-"/>
+            </a:pPr>
+            <a:r>
+              <a:rPr lang="en-US" sz="1200" dirty="0" err="1"/>
+              <a:t>i</a:t>
+            </a:r>
+            <a:r>
+              <a:rPr lang="en-US" sz="1200" dirty="0" err="1" smtClean="0"/>
+              <a:t>nt</a:t>
+            </a:r>
+            <a:r>
+              <a:rPr lang="en-US" sz="1200" dirty="0" smtClean="0"/>
+              <a:t> : </a:t>
+            </a:r>
+            <a:r>
+              <a:rPr lang="en-US" sz="1200" dirty="0" err="1" smtClean="0"/>
+              <a:t>userId</a:t>
             </a:r>
             <a:r>
               <a:rPr lang="en-US" sz="1200" dirty="0" smtClean="0"/>
@@ -4176,8 +4870,23 @@
             </a:br>
             <a:r>
               <a:rPr lang="en-US" sz="1200" dirty="0" smtClean="0"/>
-              <a:t>--------------------------------------------</a:t>
-            </a:r>
+              <a:t>------------------------------------------</a:t>
+            </a:r>
+          </a:p>
+          <a:p>
+            <a:pPr marL="171450" indent="-171450" algn="ctr">
+              <a:buFontTx/>
+              <a:buChar char="-"/>
+            </a:pPr>
+            <a:r>
+              <a:rPr lang="en-US" sz="1200" dirty="0" err="1" smtClean="0"/>
+              <a:t>getUser</a:t>
+            </a:r>
+            <a:r>
+              <a:rPr lang="en-US" sz="1200" dirty="0" smtClean="0"/>
+              <a:t> : User</a:t>
+            </a:r>
+            <a:endParaRPr lang="en-US" sz="1200" dirty="0" smtClean="0"/>
           </a:p>
           <a:p>
             <a:pPr algn="ctr"/>
@@ -4200,7 +4909,7 @@
         </p:nvCxnSpPr>
         <p:spPr>
           <a:xfrm flipH="1">
-            <a:off x="3044287" y="2754362"/>
+            <a:off x="3044287" y="2636537"/>
             <a:ext cx="3140193" cy="0"/>
           </a:xfrm>
           <a:prstGeom prst="straightConnector1">
@@ -4236,8 +4945,8 @@
         </p:nvCxnSpPr>
         <p:spPr>
           <a:xfrm flipV="1">
-            <a:off x="2616097" y="2754362"/>
-            <a:ext cx="3568383" cy="3001448"/>
+            <a:off x="2616097" y="2636537"/>
+            <a:ext cx="3568383" cy="2949492"/>
           </a:xfrm>
           <a:prstGeom prst="straightConnector1">
             <a:avLst/>
@@ -4272,8 +4981,8 @@
         </p:nvCxnSpPr>
         <p:spPr>
           <a:xfrm flipV="1">
-            <a:off x="2616097" y="5746569"/>
-            <a:ext cx="3568383" cy="9241"/>
+            <a:off x="2616097" y="5568825"/>
+            <a:ext cx="3525246" cy="17204"/>
           </a:xfrm>
           <a:prstGeom prst="straightConnector1">
             <a:avLst/>
@@ -4308,8 +5017,8 @@
         </p:nvCxnSpPr>
         <p:spPr>
           <a:xfrm flipV="1">
-            <a:off x="1759320" y="3908524"/>
-            <a:ext cx="0" cy="970122"/>
+            <a:off x="1754323" y="3790699"/>
+            <a:ext cx="4997" cy="825834"/>
           </a:xfrm>
           <a:prstGeom prst="straightConnector1">
             <a:avLst/>
@@ -4341,7 +5050,7 @@
         </p:nvSpPr>
         <p:spPr>
           <a:xfrm>
-            <a:off x="2616097" y="5146404"/>
+            <a:off x="2616097" y="5028579"/>
             <a:ext cx="288135" cy="369332"/>
           </a:xfrm>
           <a:prstGeom prst="rect">
@@ -4371,7 +5080,7 @@
         </p:nvSpPr>
         <p:spPr>
           <a:xfrm>
-            <a:off x="2740476" y="5796122"/>
+            <a:off x="2740476" y="5678297"/>
             <a:ext cx="288135" cy="369332"/>
           </a:xfrm>
           <a:prstGeom prst="rect">
@@ -4401,7 +5110,7 @@
         </p:nvSpPr>
         <p:spPr>
           <a:xfrm>
-            <a:off x="5752300" y="5337683"/>
+            <a:off x="5809183" y="5678297"/>
             <a:ext cx="306394" cy="646331"/>
           </a:xfrm>
           <a:prstGeom prst="rect">
@@ -4434,7 +5143,7 @@
         </p:nvSpPr>
         <p:spPr>
           <a:xfrm>
-            <a:off x="5897706" y="3013115"/>
+            <a:off x="5897706" y="2895290"/>
             <a:ext cx="306394" cy="369332"/>
           </a:xfrm>
           <a:prstGeom prst="rect">
@@ -4464,7 +5173,7 @@
         </p:nvSpPr>
         <p:spPr>
           <a:xfrm>
-            <a:off x="1842672" y="4509314"/>
+            <a:off x="1842671" y="4249750"/>
             <a:ext cx="288135" cy="369332"/>
           </a:xfrm>
           <a:prstGeom prst="rect">
@@ -4483,6 +5192,101 @@
               <a:t>1</a:t>
             </a:r>
             <a:endParaRPr lang="en-US" dirty="0"/>
+          </a:p>
+        </p:txBody>
+      </p:sp>
+      <p:cxnSp>
+        <p:nvCxnSpPr>
+          <p:cNvPr id="6" name="Straight Arrow Connector 5"/>
+          <p:cNvCxnSpPr>
+            <a:stCxn id="18" idx="1"/>
+            <a:endCxn id="4" idx="3"/>
+          </p:cNvCxnSpPr>
+          <p:nvPr/>
+        </p:nvCxnSpPr>
+        <p:spPr>
+          <a:xfrm flipH="1" flipV="1">
+            <a:off x="3044287" y="2636537"/>
+            <a:ext cx="3097056" cy="2932288"/>
+          </a:xfrm>
+          <a:prstGeom prst="straightConnector1">
+            <a:avLst/>
+          </a:prstGeom>
+          <a:ln w="25400">
+            <a:tailEnd type="arrow"/>
+          </a:ln>
+        </p:spPr>
+        <p:style>
+          <a:lnRef idx="1">
+            <a:schemeClr val="accent1"/>
+          </a:lnRef>
+          <a:fillRef idx="0">
+            <a:schemeClr val="accent1"/>
+          </a:fillRef>
+          <a:effectRef idx="0">
+            <a:schemeClr val="accent1"/>
+          </a:effectRef>
+          <a:fontRef idx="minor">
+            <a:schemeClr val="tx1"/>
+          </a:fontRef>
+        </p:style>
+      </p:cxnSp>
+      <p:sp>
+        <p:nvSpPr>
+          <p:cNvPr id="21" name="TextBox 20"/>
+          <p:cNvSpPr txBox="1"/>
+          <p:nvPr/>
+        </p:nvSpPr>
+        <p:spPr>
+          <a:xfrm>
+            <a:off x="5680242" y="4762667"/>
+            <a:ext cx="306394" cy="369332"/>
+          </a:xfrm>
+          <a:prstGeom prst="rect">
+            <a:avLst/>
+          </a:prstGeom>
+          <a:noFill/>
+        </p:spPr>
+        <p:txBody>
+          <a:bodyPr wrap="none" rtlCol="0">
+            <a:spAutoFit/>
+          </a:bodyPr>
+          <a:lstStyle/>
+          <a:p>
+            <a:r>
+              <a:rPr lang="en-US" dirty="0" smtClean="0"/>
+              <a:t>n</a:t>
+            </a:r>
+            <a:endParaRPr lang="en-US" dirty="0"/>
+          </a:p>
+        </p:txBody>
+      </p:sp>
+      <p:sp>
+        <p:nvSpPr>
+          <p:cNvPr id="23" name="TextBox 22"/>
+          <p:cNvSpPr txBox="1"/>
+          <p:nvPr/>
+        </p:nvSpPr>
+        <p:spPr>
+          <a:xfrm>
+            <a:off x="3145429" y="3052035"/>
+            <a:ext cx="288135" cy="369332"/>
+          </a:xfrm>
+          <a:prstGeom prst="rect">
+            <a:avLst/>
+          </a:prstGeom>
+          <a:noFill/>
+        </p:spPr>
+        <p:txBody>
+          <a:bodyPr wrap="none" rtlCol="0">
+            <a:spAutoFit/>
+          </a:bodyPr>
+          <a:lstStyle/>
+          <a:p>
+            <a:r>
+              <a:rPr lang="en-US" dirty="0" smtClean="0"/>
+              <a:t>1</a:t>
+            </a:r>
           </a:p>
         </p:txBody>
       </p:sp>
@@ -4540,11 +5344,276 @@
           <a:p>
             <a:r>
               <a:rPr lang="en-US" dirty="0" smtClean="0"/>
-              <a:t>UML Use Case </a:t>
-            </a:r>
+              <a:t>Other Class</a:t>
+            </a:r>
+            <a:endParaRPr lang="en-US" dirty="0"/>
+          </a:p>
+        </p:txBody>
+      </p:sp>
+      <p:sp>
+        <p:nvSpPr>
+          <p:cNvPr id="4" name="TextBox 3"/>
+          <p:cNvSpPr txBox="1"/>
+          <p:nvPr/>
+        </p:nvSpPr>
+        <p:spPr>
+          <a:xfrm>
+            <a:off x="200025" y="2234849"/>
+            <a:ext cx="8772525" cy="3477875"/>
+          </a:xfrm>
+          <a:prstGeom prst="rect">
+            <a:avLst/>
+          </a:prstGeom>
+          <a:noFill/>
+          <a:ln>
+            <a:solidFill>
+              <a:schemeClr val="tx1"/>
+            </a:solidFill>
+          </a:ln>
+        </p:spPr>
+        <p:txBody>
+          <a:bodyPr wrap="square" rtlCol="0">
+            <a:spAutoFit/>
+          </a:bodyPr>
+          <a:lstStyle/>
+          <a:p>
+            <a:pPr algn="ctr"/>
+            <a:r>
+              <a:rPr lang="en-US" sz="2000" dirty="0" err="1" smtClean="0"/>
+              <a:t>SQLHelper</a:t>
+            </a:r>
+            <a:endParaRPr lang="en-US" sz="2000" dirty="0" smtClean="0"/>
+          </a:p>
+          <a:p>
+            <a:pPr algn="ctr"/>
+            <a:r>
+              <a:rPr lang="en-US" sz="2000" dirty="0" smtClean="0"/>
+              <a:t>---------------------------------------------</a:t>
+            </a:r>
+          </a:p>
+          <a:p>
+            <a:pPr algn="ctr"/>
+            <a:r>
+              <a:rPr lang="en-US" sz="2000" dirty="0" smtClean="0"/>
+              <a:t>---------------------------------------------</a:t>
+            </a:r>
+            <a:endParaRPr lang="en-US" sz="2000" dirty="0" smtClean="0"/>
+          </a:p>
+          <a:p>
+            <a:r>
+              <a:rPr lang="en-US" sz="2000" dirty="0" smtClean="0"/>
+              <a:t>+ </a:t>
+            </a:r>
+            <a:r>
+              <a:rPr lang="en-US" sz="2000" dirty="0" err="1" smtClean="0"/>
+              <a:t>getRatingsByCommentId</a:t>
+            </a:r>
+            <a:r>
+              <a:rPr lang="en-US" sz="2000" dirty="0" smtClean="0"/>
+              <a:t>() </a:t>
+            </a:r>
+            <a:r>
+              <a:rPr lang="en-US" sz="2000" dirty="0" smtClean="0"/>
+              <a:t>: </a:t>
+            </a:r>
+            <a:r>
+              <a:rPr lang="en-US" sz="2000" dirty="0" err="1" smtClean="0"/>
+              <a:t>ArrayList</a:t>
+            </a:r>
+            <a:r>
+              <a:rPr lang="en-US" sz="2000" dirty="0" smtClean="0"/>
+              <a:t>&lt;Rating&gt;</a:t>
+            </a:r>
+          </a:p>
+          <a:p>
+            <a:r>
+              <a:rPr lang="en-US" sz="2000" dirty="0" smtClean="0"/>
+              <a:t>+ </a:t>
+            </a:r>
+            <a:r>
+              <a:rPr lang="en-US" sz="2000" dirty="0" err="1" smtClean="0"/>
+              <a:t>getUserById</a:t>
+            </a:r>
+            <a:r>
+              <a:rPr lang="en-US" sz="2000" dirty="0" smtClean="0"/>
+              <a:t>() : User</a:t>
+            </a:r>
+          </a:p>
+          <a:p>
+            <a:r>
+              <a:rPr lang="en-US" sz="2000" dirty="0" smtClean="0"/>
+              <a:t>+ </a:t>
+            </a:r>
+            <a:r>
+              <a:rPr lang="en-US" sz="2000" dirty="0" err="1" smtClean="0"/>
+              <a:t>getUserByUsername</a:t>
+            </a:r>
+            <a:r>
+              <a:rPr lang="en-US" sz="2000" dirty="0" smtClean="0"/>
+              <a:t>() : User</a:t>
+            </a:r>
+          </a:p>
+          <a:p>
+            <a:r>
+              <a:rPr lang="en-US" sz="2000" dirty="0" smtClean="0"/>
+              <a:t>+ </a:t>
+            </a:r>
+            <a:r>
+              <a:rPr lang="en-US" sz="2000" dirty="0" err="1" smtClean="0"/>
+              <a:t>getCommentsByHappeninId</a:t>
+            </a:r>
+            <a:r>
+              <a:rPr lang="en-US" sz="2000" dirty="0" smtClean="0"/>
+              <a:t>() : </a:t>
+            </a:r>
+            <a:r>
+              <a:rPr lang="en-US" sz="2000" dirty="0" err="1" smtClean="0"/>
+              <a:t>ArrayList</a:t>
+            </a:r>
+            <a:r>
+              <a:rPr lang="en-US" sz="2000" dirty="0" smtClean="0"/>
+              <a:t>&lt;Comment&gt;</a:t>
+            </a:r>
+          </a:p>
+          <a:p>
+            <a:r>
+              <a:rPr lang="en-US" sz="2000" dirty="0" smtClean="0"/>
+              <a:t>+ </a:t>
+            </a:r>
+            <a:r>
+              <a:rPr lang="en-US" sz="2000" dirty="0" err="1" smtClean="0"/>
+              <a:t>getHappenins</a:t>
+            </a:r>
+            <a:r>
+              <a:rPr lang="en-US" sz="2000" dirty="0" smtClean="0"/>
+              <a:t>() : </a:t>
+            </a:r>
+            <a:r>
+              <a:rPr lang="en-US" sz="2000" dirty="0" err="1" smtClean="0"/>
+              <a:t>ArrayList</a:t>
+            </a:r>
+            <a:r>
+              <a:rPr lang="en-US" sz="2000" dirty="0" smtClean="0"/>
+              <a:t>&lt;</a:t>
+            </a:r>
+            <a:r>
+              <a:rPr lang="en-US" sz="2000" dirty="0" err="1" smtClean="0"/>
+              <a:t>Happenin</a:t>
+            </a:r>
+            <a:r>
+              <a:rPr lang="en-US" sz="2000" dirty="0" smtClean="0"/>
+              <a:t>&gt;</a:t>
+            </a:r>
+          </a:p>
+          <a:p>
+            <a:r>
+              <a:rPr lang="en-US" sz="2000" dirty="0" smtClean="0"/>
+              <a:t>+ </a:t>
+            </a:r>
+            <a:r>
+              <a:rPr lang="en-US" sz="2000" dirty="0" err="1" smtClean="0"/>
+              <a:t>insertComment</a:t>
+            </a:r>
+            <a:r>
+              <a:rPr lang="en-US" sz="2000" dirty="0" smtClean="0"/>
+              <a:t>(String comment) : void</a:t>
+            </a:r>
+          </a:p>
+          <a:p>
+            <a:r>
+              <a:rPr lang="en-US" sz="2000" dirty="0" smtClean="0"/>
+              <a:t>+ </a:t>
+            </a:r>
+            <a:r>
+              <a:rPr lang="en-US" sz="2000" dirty="0" err="1" smtClean="0"/>
+              <a:t>createUser</a:t>
+            </a:r>
+            <a:r>
+              <a:rPr lang="en-US" sz="2000" dirty="0" smtClean="0"/>
+              <a:t>(String username, Strin</a:t>
+            </a:r>
+            <a:r>
+              <a:rPr lang="en-US" sz="2000" dirty="0" smtClean="0"/>
+              <a:t>g password, String email, String name) : void</a:t>
+            </a:r>
+          </a:p>
+          <a:p>
+            <a:r>
+              <a:rPr lang="en-US" sz="2000" dirty="0" smtClean="0"/>
+              <a:t>+ </a:t>
+            </a:r>
+            <a:r>
+              <a:rPr lang="en-US" sz="2000" dirty="0" err="1" smtClean="0"/>
+              <a:t>parseMySqlDate</a:t>
+            </a:r>
+            <a:r>
+              <a:rPr lang="en-US" sz="2000" dirty="0" smtClean="0"/>
+              <a:t>(String </a:t>
+            </a:r>
+            <a:r>
+              <a:rPr lang="en-US" sz="2000" dirty="0" err="1" smtClean="0"/>
+              <a:t>dateString</a:t>
+            </a:r>
+            <a:r>
+              <a:rPr lang="en-US" sz="2000" dirty="0" smtClean="0"/>
+              <a:t>) : </a:t>
+            </a:r>
+            <a:r>
+              <a:rPr lang="en-US" sz="2000" dirty="0" err="1" smtClean="0"/>
+              <a:t>DateTime</a:t>
+            </a:r>
+            <a:endParaRPr lang="en-US" sz="2000" dirty="0"/>
+          </a:p>
+        </p:txBody>
+      </p:sp>
+    </p:spTree>
+    <p:extLst>
+      <p:ext uri="{BB962C8B-B14F-4D97-AF65-F5344CB8AC3E}">
+        <p14:creationId xmlns:p14="http://schemas.microsoft.com/office/powerpoint/2010/main" val="3065702726"/>
+      </p:ext>
+    </p:extLst>
+  </p:cSld>
+  <p:clrMapOvr>
+    <a:masterClrMapping/>
+  </p:clrMapOvr>
+</p:sld>
+</file>
+
+<file path=ppt/slides/slide5.xml><?xml version="1.0" encoding="utf-8"?>
+<p:sld xmlns:a="http://schemas.openxmlformats.org/drawingml/2006/main" xmlns:r="http://schemas.openxmlformats.org/officeDocument/2006/relationships" xmlns:p="http://schemas.openxmlformats.org/presentationml/2006/main">
+  <p:cSld>
+    <p:spTree>
+      <p:nvGrpSpPr>
+        <p:cNvPr id="1" name=""/>
+        <p:cNvGrpSpPr/>
+        <p:nvPr/>
+      </p:nvGrpSpPr>
+      <p:grpSpPr>
+        <a:xfrm>
+          <a:off x="0" y="0"/>
+          <a:ext cx="0" cy="0"/>
+          <a:chOff x="0" y="0"/>
+          <a:chExt cx="0" cy="0"/>
+        </a:xfrm>
+      </p:grpSpPr>
+      <p:sp>
+        <p:nvSpPr>
+          <p:cNvPr id="2" name="Title 1"/>
+          <p:cNvSpPr>
+            <a:spLocks noGrp="1"/>
+          </p:cNvSpPr>
+          <p:nvPr>
+            <p:ph type="title"/>
+          </p:nvPr>
+        </p:nvSpPr>
+        <p:spPr/>
+        <p:txBody>
+          <a:bodyPr/>
+          <a:lstStyle/>
+          <a:p>
             <a:r>
               <a:rPr lang="en-US" dirty="0" smtClean="0"/>
-              <a:t>Diagram</a:t>
+              <a:t>UML Use Case Diagram</a:t>
             </a:r>
             <a:endParaRPr lang="en-US" dirty="0"/>
           </a:p>
@@ -6097,7 +7166,7 @@
 </p:sld>
 </file>
 
-<file path=ppt/slides/slide5.xml><?xml version="1.0" encoding="utf-8"?>
+<file path=ppt/slides/slide6.xml><?xml version="1.0" encoding="utf-8"?>
 <p:sld xmlns:a="http://schemas.openxmlformats.org/drawingml/2006/main" xmlns:r="http://schemas.openxmlformats.org/officeDocument/2006/relationships" xmlns:p="http://schemas.openxmlformats.org/presentationml/2006/main">
   <p:cSld>
     <p:spTree>
@@ -6266,7 +7335,7 @@
         <p:spPr>
           <a:xfrm>
             <a:off x="1890942" y="1349406"/>
-            <a:ext cx="574196" cy="369332"/>
+            <a:ext cx="625492" cy="369332"/>
           </a:xfrm>
           <a:prstGeom prst="rect">
             <a:avLst/>
@@ -6281,7 +7350,7 @@
           <a:p>
             <a:r>
               <a:rPr lang="en-US" dirty="0" smtClean="0"/>
-              <a:t>App</a:t>
+              <a:t>User</a:t>
             </a:r>
             <a:endParaRPr lang="en-US" dirty="0"/>
           </a:p>
@@ -6295,8 +7364,8 @@
         </p:nvSpPr>
         <p:spPr>
           <a:xfrm>
-            <a:off x="4402586" y="1349406"/>
-            <a:ext cx="803425" cy="369332"/>
+            <a:off x="4517201" y="1349406"/>
+            <a:ext cx="574196" cy="369332"/>
           </a:xfrm>
           <a:prstGeom prst="rect">
             <a:avLst/>
@@ -6312,7 +7381,7 @@
             <a:pPr algn="ctr"/>
             <a:r>
               <a:rPr lang="en-US" dirty="0" smtClean="0"/>
-              <a:t>Server</a:t>
+              <a:t>App</a:t>
             </a:r>
             <a:endParaRPr lang="en-US" dirty="0"/>
           </a:p>
@@ -6351,14 +7420,14 @@
       </p:sp>
       <p:cxnSp>
         <p:nvCxnSpPr>
-          <p:cNvPr id="11" name="Straight Arrow Connector 10"/>
+          <p:cNvPr id="16" name="Straight Arrow Connector 15"/>
           <p:cNvCxnSpPr/>
           <p:nvPr/>
         </p:nvCxnSpPr>
         <p:spPr>
           <a:xfrm>
-            <a:off x="124287" y="2130641"/>
-            <a:ext cx="1725280" cy="0"/>
+            <a:off x="2506514" y="2459115"/>
+            <a:ext cx="1969311" cy="0"/>
           </a:xfrm>
           <a:prstGeom prst="straightConnector1">
             <a:avLst/>
@@ -6384,14 +7453,14 @@
       </p:cxnSp>
       <p:sp>
         <p:nvSpPr>
-          <p:cNvPr id="14" name="TextBox 13"/>
+          <p:cNvPr id="17" name="TextBox 16"/>
           <p:cNvSpPr txBox="1"/>
           <p:nvPr/>
         </p:nvSpPr>
         <p:spPr>
           <a:xfrm>
-            <a:off x="310718" y="1802167"/>
-            <a:ext cx="1372492" cy="369332"/>
+            <a:off x="2707689" y="2130641"/>
+            <a:ext cx="1308371" cy="369332"/>
           </a:xfrm>
           <a:prstGeom prst="rect">
             <a:avLst/>
@@ -6406,70 +7475,7 @@
           <a:p>
             <a:r>
               <a:rPr lang="en-US" dirty="0" smtClean="0"/>
-              <a:t>Sign in input</a:t>
-            </a:r>
-            <a:endParaRPr lang="en-US" dirty="0"/>
-          </a:p>
-        </p:txBody>
-      </p:sp>
-      <p:cxnSp>
-        <p:nvCxnSpPr>
-          <p:cNvPr id="16" name="Straight Arrow Connector 15"/>
-          <p:cNvCxnSpPr/>
-          <p:nvPr/>
-        </p:nvCxnSpPr>
-        <p:spPr>
-          <a:xfrm>
-            <a:off x="2506514" y="2459115"/>
-            <a:ext cx="1969311" cy="0"/>
-          </a:xfrm>
-          <a:prstGeom prst="straightConnector1">
-            <a:avLst/>
-          </a:prstGeom>
-          <a:ln>
-            <a:tailEnd type="arrow"/>
-          </a:ln>
-        </p:spPr>
-        <p:style>
-          <a:lnRef idx="1">
-            <a:schemeClr val="accent1"/>
-          </a:lnRef>
-          <a:fillRef idx="0">
-            <a:schemeClr val="accent1"/>
-          </a:fillRef>
-          <a:effectRef idx="0">
-            <a:schemeClr val="accent1"/>
-          </a:effectRef>
-          <a:fontRef idx="minor">
-            <a:schemeClr val="tx1"/>
-          </a:fontRef>
-        </p:style>
-      </p:cxnSp>
-      <p:sp>
-        <p:nvSpPr>
-          <p:cNvPr id="17" name="TextBox 16"/>
-          <p:cNvSpPr txBox="1"/>
-          <p:nvPr/>
-        </p:nvSpPr>
-        <p:spPr>
-          <a:xfrm>
-            <a:off x="2707689" y="2130641"/>
-            <a:ext cx="1183337" cy="369332"/>
-          </a:xfrm>
-          <a:prstGeom prst="rect">
-            <a:avLst/>
-          </a:prstGeom>
-          <a:noFill/>
-        </p:spPr>
-        <p:txBody>
-          <a:bodyPr wrap="none" rtlCol="0">
-            <a:spAutoFit/>
-          </a:bodyPr>
-          <a:lstStyle/>
-          <a:p>
-            <a:r>
-              <a:rPr lang="en-US" dirty="0" smtClean="0"/>
-              <a:t>Sends info</a:t>
+              <a:t>Sends input</a:t>
             </a:r>
             <a:endParaRPr lang="en-US" dirty="0"/>
           </a:p>
@@ -6816,7 +7822,7 @@
 </p:sld>
 </file>
 
-<file path=ppt/slides/slide6.xml><?xml version="1.0" encoding="utf-8"?>
+<file path=ppt/slides/slide7.xml><?xml version="1.0" encoding="utf-8"?>
 <p:sld xmlns:a="http://schemas.openxmlformats.org/drawingml/2006/main" xmlns:r="http://schemas.openxmlformats.org/officeDocument/2006/relationships" xmlns:p="http://schemas.openxmlformats.org/presentationml/2006/main">
   <p:cSld>
     <p:spTree>
@@ -6985,7 +7991,7 @@
         <p:spPr>
           <a:xfrm>
             <a:off x="1890942" y="1349406"/>
-            <a:ext cx="574196" cy="369332"/>
+            <a:ext cx="625492" cy="369332"/>
           </a:xfrm>
           <a:prstGeom prst="rect">
             <a:avLst/>
@@ -7000,7 +8006,7 @@
           <a:p>
             <a:r>
               <a:rPr lang="en-US" dirty="0" smtClean="0"/>
-              <a:t>App</a:t>
+              <a:t>User</a:t>
             </a:r>
             <a:endParaRPr lang="en-US" dirty="0"/>
           </a:p>
@@ -7014,8 +8020,8 @@
         </p:nvSpPr>
         <p:spPr>
           <a:xfrm>
-            <a:off x="4402586" y="1349406"/>
-            <a:ext cx="803425" cy="369332"/>
+            <a:off x="4517201" y="1349406"/>
+            <a:ext cx="574196" cy="369332"/>
           </a:xfrm>
           <a:prstGeom prst="rect">
             <a:avLst/>
@@ -7031,7 +8037,7 @@
             <a:pPr algn="ctr"/>
             <a:r>
               <a:rPr lang="en-US" dirty="0" smtClean="0"/>
-              <a:t>Server</a:t>
+              <a:t>App</a:t>
             </a:r>
             <a:endParaRPr lang="en-US" dirty="0"/>
           </a:p>
@@ -7139,7 +8145,7 @@
         </p:nvCxnSpPr>
         <p:spPr>
           <a:xfrm flipH="1">
-            <a:off x="2506514" y="3275860"/>
+            <a:off x="2516434" y="3460526"/>
             <a:ext cx="1969311" cy="0"/>
           </a:xfrm>
           <a:prstGeom prst="straightConnector1">
@@ -7172,7 +8178,7 @@
         </p:nvGrpSpPr>
         <p:grpSpPr>
           <a:xfrm>
-            <a:off x="5132772" y="2192199"/>
+            <a:off x="5132772" y="2281650"/>
             <a:ext cx="1117108" cy="1083076"/>
             <a:chOff x="5132772" y="2192784"/>
             <a:chExt cx="1117108" cy="1083076"/>
@@ -7328,7 +8334,7 @@
         </p:nvSpPr>
         <p:spPr>
           <a:xfrm>
-            <a:off x="5449409" y="3275860"/>
+            <a:off x="5449409" y="3332420"/>
             <a:ext cx="1665841" cy="369332"/>
           </a:xfrm>
           <a:prstGeom prst="rect">
@@ -7358,7 +8364,7 @@
         </p:nvSpPr>
         <p:spPr>
           <a:xfrm>
-            <a:off x="2858610" y="2867487"/>
+            <a:off x="2858610" y="3032611"/>
             <a:ext cx="1292341" cy="369332"/>
           </a:xfrm>
           <a:prstGeom prst="rect">
@@ -7384,1034 +8390,6 @@
     <p:extLst>
       <p:ext uri="{BB962C8B-B14F-4D97-AF65-F5344CB8AC3E}">
         <p14:creationId xmlns:p14="http://schemas.microsoft.com/office/powerpoint/2010/main" val="1140132932"/>
-      </p:ext>
-    </p:extLst>
-  </p:cSld>
-  <p:clrMapOvr>
-    <a:masterClrMapping/>
-  </p:clrMapOvr>
-  <p:timing>
-    <p:tnLst>
-      <p:par>
-        <p:cTn id="1" dur="indefinite" restart="never" nodeType="tmRoot"/>
-      </p:par>
-    </p:tnLst>
-  </p:timing>
-</p:sld>
-</file>
-
-<file path=ppt/slides/slide7.xml><?xml version="1.0" encoding="utf-8"?>
-<p:sld xmlns:a="http://schemas.openxmlformats.org/drawingml/2006/main" xmlns:r="http://schemas.openxmlformats.org/officeDocument/2006/relationships" xmlns:p="http://schemas.openxmlformats.org/presentationml/2006/main">
-  <p:cSld>
-    <p:spTree>
-      <p:nvGrpSpPr>
-        <p:cNvPr id="1" name=""/>
-        <p:cNvGrpSpPr/>
-        <p:nvPr/>
-      </p:nvGrpSpPr>
-      <p:grpSpPr>
-        <a:xfrm>
-          <a:off x="0" y="0"/>
-          <a:ext cx="0" cy="0"/>
-          <a:chOff x="0" y="0"/>
-          <a:chExt cx="0" cy="0"/>
-        </a:xfrm>
-      </p:grpSpPr>
-      <p:sp>
-        <p:nvSpPr>
-          <p:cNvPr id="2" name="Title 1"/>
-          <p:cNvSpPr>
-            <a:spLocks noGrp="1"/>
-          </p:cNvSpPr>
-          <p:nvPr>
-            <p:ph type="title"/>
-          </p:nvPr>
-        </p:nvSpPr>
-        <p:spPr/>
-        <p:txBody>
-          <a:bodyPr/>
-          <a:lstStyle/>
-          <a:p>
-            <a:r>
-              <a:rPr lang="en-US" dirty="0" smtClean="0"/>
-              <a:t>View Happenin’</a:t>
-            </a:r>
-            <a:endParaRPr lang="en-US" dirty="0"/>
-          </a:p>
-        </p:txBody>
-      </p:sp>
-      <p:sp>
-        <p:nvSpPr>
-          <p:cNvPr id="4" name="Rectangle 3"/>
-          <p:cNvSpPr/>
-          <p:nvPr/>
-        </p:nvSpPr>
-        <p:spPr>
-          <a:xfrm>
-            <a:off x="1849567" y="1802167"/>
-            <a:ext cx="656947" cy="4296792"/>
-          </a:xfrm>
-          <a:prstGeom prst="rect">
-            <a:avLst/>
-          </a:prstGeom>
-        </p:spPr>
-        <p:style>
-          <a:lnRef idx="2">
-            <a:schemeClr val="accent1">
-              <a:shade val="50000"/>
-            </a:schemeClr>
-          </a:lnRef>
-          <a:fillRef idx="1">
-            <a:schemeClr val="accent1"/>
-          </a:fillRef>
-          <a:effectRef idx="0">
-            <a:schemeClr val="accent1"/>
-          </a:effectRef>
-          <a:fontRef idx="minor">
-            <a:schemeClr val="lt1"/>
-          </a:fontRef>
-        </p:style>
-        <p:txBody>
-          <a:bodyPr rtlCol="0" anchor="ctr"/>
-          <a:lstStyle/>
-          <a:p>
-            <a:pPr algn="ctr"/>
-            <a:endParaRPr lang="en-US"/>
-          </a:p>
-        </p:txBody>
-      </p:sp>
-      <p:sp>
-        <p:nvSpPr>
-          <p:cNvPr id="5" name="Rectangle 4"/>
-          <p:cNvSpPr/>
-          <p:nvPr/>
-        </p:nvSpPr>
-        <p:spPr>
-          <a:xfrm>
-            <a:off x="4475825" y="1802167"/>
-            <a:ext cx="656947" cy="4296792"/>
-          </a:xfrm>
-          <a:prstGeom prst="rect">
-            <a:avLst/>
-          </a:prstGeom>
-        </p:spPr>
-        <p:style>
-          <a:lnRef idx="2">
-            <a:schemeClr val="accent1">
-              <a:shade val="50000"/>
-            </a:schemeClr>
-          </a:lnRef>
-          <a:fillRef idx="1">
-            <a:schemeClr val="accent1"/>
-          </a:fillRef>
-          <a:effectRef idx="0">
-            <a:schemeClr val="accent1"/>
-          </a:effectRef>
-          <a:fontRef idx="minor">
-            <a:schemeClr val="lt1"/>
-          </a:fontRef>
-        </p:style>
-        <p:txBody>
-          <a:bodyPr rtlCol="0" anchor="ctr"/>
-          <a:lstStyle/>
-          <a:p>
-            <a:pPr algn="ctr"/>
-            <a:endParaRPr lang="en-US"/>
-          </a:p>
-        </p:txBody>
-      </p:sp>
-      <p:sp>
-        <p:nvSpPr>
-          <p:cNvPr id="6" name="Rectangle 5"/>
-          <p:cNvSpPr/>
-          <p:nvPr/>
-        </p:nvSpPr>
-        <p:spPr>
-          <a:xfrm>
-            <a:off x="7344792" y="1802167"/>
-            <a:ext cx="656947" cy="4296792"/>
-          </a:xfrm>
-          <a:prstGeom prst="rect">
-            <a:avLst/>
-          </a:prstGeom>
-        </p:spPr>
-        <p:style>
-          <a:lnRef idx="2">
-            <a:schemeClr val="accent1">
-              <a:shade val="50000"/>
-            </a:schemeClr>
-          </a:lnRef>
-          <a:fillRef idx="1">
-            <a:schemeClr val="accent1"/>
-          </a:fillRef>
-          <a:effectRef idx="0">
-            <a:schemeClr val="accent1"/>
-          </a:effectRef>
-          <a:fontRef idx="minor">
-            <a:schemeClr val="lt1"/>
-          </a:fontRef>
-        </p:style>
-        <p:txBody>
-          <a:bodyPr rtlCol="0" anchor="ctr"/>
-          <a:lstStyle/>
-          <a:p>
-            <a:pPr algn="ctr"/>
-            <a:endParaRPr lang="en-US"/>
-          </a:p>
-        </p:txBody>
-      </p:sp>
-      <p:sp>
-        <p:nvSpPr>
-          <p:cNvPr id="7" name="TextBox 6"/>
-          <p:cNvSpPr txBox="1"/>
-          <p:nvPr/>
-        </p:nvSpPr>
-        <p:spPr>
-          <a:xfrm>
-            <a:off x="1890942" y="1349406"/>
-            <a:ext cx="574196" cy="369332"/>
-          </a:xfrm>
-          <a:prstGeom prst="rect">
-            <a:avLst/>
-          </a:prstGeom>
-          <a:noFill/>
-        </p:spPr>
-        <p:txBody>
-          <a:bodyPr wrap="none" rtlCol="0">
-            <a:spAutoFit/>
-          </a:bodyPr>
-          <a:lstStyle/>
-          <a:p>
-            <a:r>
-              <a:rPr lang="en-US" dirty="0" smtClean="0"/>
-              <a:t>App</a:t>
-            </a:r>
-            <a:endParaRPr lang="en-US" dirty="0"/>
-          </a:p>
-        </p:txBody>
-      </p:sp>
-      <p:sp>
-        <p:nvSpPr>
-          <p:cNvPr id="8" name="TextBox 7"/>
-          <p:cNvSpPr txBox="1"/>
-          <p:nvPr/>
-        </p:nvSpPr>
-        <p:spPr>
-          <a:xfrm>
-            <a:off x="4402586" y="1349406"/>
-            <a:ext cx="803425" cy="369332"/>
-          </a:xfrm>
-          <a:prstGeom prst="rect">
-            <a:avLst/>
-          </a:prstGeom>
-          <a:noFill/>
-        </p:spPr>
-        <p:txBody>
-          <a:bodyPr wrap="none" rtlCol="0">
-            <a:spAutoFit/>
-          </a:bodyPr>
-          <a:lstStyle/>
-          <a:p>
-            <a:pPr algn="ctr"/>
-            <a:r>
-              <a:rPr lang="en-US" dirty="0" smtClean="0"/>
-              <a:t>Server</a:t>
-            </a:r>
-            <a:endParaRPr lang="en-US" dirty="0"/>
-          </a:p>
-        </p:txBody>
-      </p:sp>
-      <p:sp>
-        <p:nvSpPr>
-          <p:cNvPr id="9" name="TextBox 8"/>
-          <p:cNvSpPr txBox="1"/>
-          <p:nvPr/>
-        </p:nvSpPr>
-        <p:spPr>
-          <a:xfrm>
-            <a:off x="7435059" y="1317140"/>
-            <a:ext cx="476413" cy="369332"/>
-          </a:xfrm>
-          <a:prstGeom prst="rect">
-            <a:avLst/>
-          </a:prstGeom>
-          <a:noFill/>
-        </p:spPr>
-        <p:txBody>
-          <a:bodyPr wrap="none" rtlCol="0">
-            <a:spAutoFit/>
-          </a:bodyPr>
-          <a:lstStyle/>
-          <a:p>
-            <a:pPr algn="ctr"/>
-            <a:r>
-              <a:rPr lang="en-US" dirty="0" smtClean="0"/>
-              <a:t>DB</a:t>
-            </a:r>
-            <a:endParaRPr lang="en-US" dirty="0"/>
-          </a:p>
-        </p:txBody>
-      </p:sp>
-      <p:cxnSp>
-        <p:nvCxnSpPr>
-          <p:cNvPr id="11" name="Straight Arrow Connector 10"/>
-          <p:cNvCxnSpPr/>
-          <p:nvPr/>
-        </p:nvCxnSpPr>
-        <p:spPr>
-          <a:xfrm>
-            <a:off x="2506514" y="2485748"/>
-            <a:ext cx="1969311" cy="0"/>
-          </a:xfrm>
-          <a:prstGeom prst="straightConnector1">
-            <a:avLst/>
-          </a:prstGeom>
-          <a:ln>
-            <a:tailEnd type="arrow"/>
-          </a:ln>
-        </p:spPr>
-        <p:style>
-          <a:lnRef idx="1">
-            <a:schemeClr val="accent1"/>
-          </a:lnRef>
-          <a:fillRef idx="0">
-            <a:schemeClr val="accent1"/>
-          </a:fillRef>
-          <a:effectRef idx="0">
-            <a:schemeClr val="accent1"/>
-          </a:effectRef>
-          <a:fontRef idx="minor">
-            <a:schemeClr val="tx1"/>
-          </a:fontRef>
-        </p:style>
-      </p:cxnSp>
-      <p:cxnSp>
-        <p:nvCxnSpPr>
-          <p:cNvPr id="13" name="Straight Arrow Connector 12"/>
-          <p:cNvCxnSpPr/>
-          <p:nvPr/>
-        </p:nvCxnSpPr>
-        <p:spPr>
-          <a:xfrm flipV="1">
-            <a:off x="5132772" y="2743200"/>
-            <a:ext cx="2212020" cy="8878"/>
-          </a:xfrm>
-          <a:prstGeom prst="straightConnector1">
-            <a:avLst/>
-          </a:prstGeom>
-          <a:ln>
-            <a:tailEnd type="arrow"/>
-          </a:ln>
-        </p:spPr>
-        <p:style>
-          <a:lnRef idx="1">
-            <a:schemeClr val="accent1"/>
-          </a:lnRef>
-          <a:fillRef idx="0">
-            <a:schemeClr val="accent1"/>
-          </a:fillRef>
-          <a:effectRef idx="0">
-            <a:schemeClr val="accent1"/>
-          </a:effectRef>
-          <a:fontRef idx="minor">
-            <a:schemeClr val="tx1"/>
-          </a:fontRef>
-        </p:style>
-      </p:cxnSp>
-      <p:cxnSp>
-        <p:nvCxnSpPr>
-          <p:cNvPr id="15" name="Straight Arrow Connector 14"/>
-          <p:cNvCxnSpPr/>
-          <p:nvPr/>
-        </p:nvCxnSpPr>
-        <p:spPr>
-          <a:xfrm flipH="1">
-            <a:off x="5132772" y="3320249"/>
-            <a:ext cx="2212020" cy="53266"/>
-          </a:xfrm>
-          <a:prstGeom prst="straightConnector1">
-            <a:avLst/>
-          </a:prstGeom>
-          <a:ln>
-            <a:tailEnd type="arrow"/>
-          </a:ln>
-        </p:spPr>
-        <p:style>
-          <a:lnRef idx="1">
-            <a:schemeClr val="accent1"/>
-          </a:lnRef>
-          <a:fillRef idx="0">
-            <a:schemeClr val="accent1"/>
-          </a:fillRef>
-          <a:effectRef idx="0">
-            <a:schemeClr val="accent1"/>
-          </a:effectRef>
-          <a:fontRef idx="minor">
-            <a:schemeClr val="tx1"/>
-          </a:fontRef>
-        </p:style>
-      </p:cxnSp>
-      <p:cxnSp>
-        <p:nvCxnSpPr>
-          <p:cNvPr id="17" name="Straight Arrow Connector 16"/>
-          <p:cNvCxnSpPr/>
-          <p:nvPr/>
-        </p:nvCxnSpPr>
-        <p:spPr>
-          <a:xfrm flipV="1">
-            <a:off x="5132772" y="3746377"/>
-            <a:ext cx="2212020" cy="8877"/>
-          </a:xfrm>
-          <a:prstGeom prst="straightConnector1">
-            <a:avLst/>
-          </a:prstGeom>
-          <a:ln>
-            <a:tailEnd type="arrow"/>
-          </a:ln>
-        </p:spPr>
-        <p:style>
-          <a:lnRef idx="1">
-            <a:schemeClr val="accent1"/>
-          </a:lnRef>
-          <a:fillRef idx="0">
-            <a:schemeClr val="accent1"/>
-          </a:fillRef>
-          <a:effectRef idx="0">
-            <a:schemeClr val="accent1"/>
-          </a:effectRef>
-          <a:fontRef idx="minor">
-            <a:schemeClr val="tx1"/>
-          </a:fontRef>
-        </p:style>
-      </p:cxnSp>
-      <p:cxnSp>
-        <p:nvCxnSpPr>
-          <p:cNvPr id="19" name="Straight Arrow Connector 18"/>
-          <p:cNvCxnSpPr/>
-          <p:nvPr/>
-        </p:nvCxnSpPr>
-        <p:spPr>
-          <a:xfrm flipH="1" flipV="1">
-            <a:off x="5132772" y="4296792"/>
-            <a:ext cx="2212020" cy="17756"/>
-          </a:xfrm>
-          <a:prstGeom prst="straightConnector1">
-            <a:avLst/>
-          </a:prstGeom>
-          <a:ln>
-            <a:tailEnd type="arrow"/>
-          </a:ln>
-        </p:spPr>
-        <p:style>
-          <a:lnRef idx="1">
-            <a:schemeClr val="accent1"/>
-          </a:lnRef>
-          <a:fillRef idx="0">
-            <a:schemeClr val="accent1"/>
-          </a:fillRef>
-          <a:effectRef idx="0">
-            <a:schemeClr val="accent1"/>
-          </a:effectRef>
-          <a:fontRef idx="minor">
-            <a:schemeClr val="tx1"/>
-          </a:fontRef>
-        </p:style>
-      </p:cxnSp>
-      <p:cxnSp>
-        <p:nvCxnSpPr>
-          <p:cNvPr id="21" name="Straight Arrow Connector 20"/>
-          <p:cNvCxnSpPr/>
-          <p:nvPr/>
-        </p:nvCxnSpPr>
-        <p:spPr>
-          <a:xfrm>
-            <a:off x="5132772" y="4740676"/>
-            <a:ext cx="2212020" cy="26633"/>
-          </a:xfrm>
-          <a:prstGeom prst="straightConnector1">
-            <a:avLst/>
-          </a:prstGeom>
-          <a:ln>
-            <a:tailEnd type="arrow"/>
-          </a:ln>
-        </p:spPr>
-        <p:style>
-          <a:lnRef idx="1">
-            <a:schemeClr val="accent1"/>
-          </a:lnRef>
-          <a:fillRef idx="0">
-            <a:schemeClr val="accent1"/>
-          </a:fillRef>
-          <a:effectRef idx="0">
-            <a:schemeClr val="accent1"/>
-          </a:effectRef>
-          <a:fontRef idx="minor">
-            <a:schemeClr val="tx1"/>
-          </a:fontRef>
-        </p:style>
-      </p:cxnSp>
-      <p:cxnSp>
-        <p:nvCxnSpPr>
-          <p:cNvPr id="23" name="Straight Arrow Connector 22"/>
-          <p:cNvCxnSpPr/>
-          <p:nvPr/>
-        </p:nvCxnSpPr>
-        <p:spPr>
-          <a:xfrm flipH="1">
-            <a:off x="5132772" y="5193437"/>
-            <a:ext cx="2212020" cy="0"/>
-          </a:xfrm>
-          <a:prstGeom prst="straightConnector1">
-            <a:avLst/>
-          </a:prstGeom>
-          <a:ln>
-            <a:tailEnd type="arrow"/>
-          </a:ln>
-        </p:spPr>
-        <p:style>
-          <a:lnRef idx="1">
-            <a:schemeClr val="accent1"/>
-          </a:lnRef>
-          <a:fillRef idx="0">
-            <a:schemeClr val="accent1"/>
-          </a:fillRef>
-          <a:effectRef idx="0">
-            <a:schemeClr val="accent1"/>
-          </a:effectRef>
-          <a:fontRef idx="minor">
-            <a:schemeClr val="tx1"/>
-          </a:fontRef>
-        </p:style>
-      </p:cxnSp>
-      <p:cxnSp>
-        <p:nvCxnSpPr>
-          <p:cNvPr id="25" name="Straight Arrow Connector 24"/>
-          <p:cNvCxnSpPr/>
-          <p:nvPr/>
-        </p:nvCxnSpPr>
-        <p:spPr>
-          <a:xfrm flipH="1" flipV="1">
-            <a:off x="2506514" y="5442012"/>
-            <a:ext cx="1969311" cy="17755"/>
-          </a:xfrm>
-          <a:prstGeom prst="straightConnector1">
-            <a:avLst/>
-          </a:prstGeom>
-          <a:ln>
-            <a:tailEnd type="arrow"/>
-          </a:ln>
-        </p:spPr>
-        <p:style>
-          <a:lnRef idx="1">
-            <a:schemeClr val="accent1"/>
-          </a:lnRef>
-          <a:fillRef idx="0">
-            <a:schemeClr val="accent1"/>
-          </a:fillRef>
-          <a:effectRef idx="0">
-            <a:schemeClr val="accent1"/>
-          </a:effectRef>
-          <a:fontRef idx="minor">
-            <a:schemeClr val="tx1"/>
-          </a:fontRef>
-        </p:style>
-      </p:cxnSp>
-      <p:cxnSp>
-        <p:nvCxnSpPr>
-          <p:cNvPr id="27" name="Straight Arrow Connector 26"/>
-          <p:cNvCxnSpPr/>
-          <p:nvPr/>
-        </p:nvCxnSpPr>
-        <p:spPr>
-          <a:xfrm flipH="1" flipV="1">
-            <a:off x="2506514" y="3426781"/>
-            <a:ext cx="1969311" cy="17755"/>
-          </a:xfrm>
-          <a:prstGeom prst="straightConnector1">
-            <a:avLst/>
-          </a:prstGeom>
-          <a:ln>
-            <a:tailEnd type="arrow"/>
-          </a:ln>
-        </p:spPr>
-        <p:style>
-          <a:lnRef idx="1">
-            <a:schemeClr val="accent1"/>
-          </a:lnRef>
-          <a:fillRef idx="0">
-            <a:schemeClr val="accent1"/>
-          </a:fillRef>
-          <a:effectRef idx="0">
-            <a:schemeClr val="accent1"/>
-          </a:effectRef>
-          <a:fontRef idx="minor">
-            <a:schemeClr val="tx1"/>
-          </a:fontRef>
-        </p:style>
-      </p:cxnSp>
-      <p:cxnSp>
-        <p:nvCxnSpPr>
-          <p:cNvPr id="29" name="Straight Arrow Connector 28"/>
-          <p:cNvCxnSpPr/>
-          <p:nvPr/>
-        </p:nvCxnSpPr>
-        <p:spPr>
-          <a:xfrm flipH="1" flipV="1">
-            <a:off x="2465138" y="4394473"/>
-            <a:ext cx="2010687" cy="17755"/>
-          </a:xfrm>
-          <a:prstGeom prst="straightConnector1">
-            <a:avLst/>
-          </a:prstGeom>
-          <a:ln>
-            <a:tailEnd type="arrow"/>
-          </a:ln>
-        </p:spPr>
-        <p:style>
-          <a:lnRef idx="1">
-            <a:schemeClr val="accent1"/>
-          </a:lnRef>
-          <a:fillRef idx="0">
-            <a:schemeClr val="accent1"/>
-          </a:fillRef>
-          <a:effectRef idx="0">
-            <a:schemeClr val="accent1"/>
-          </a:effectRef>
-          <a:fontRef idx="minor">
-            <a:schemeClr val="tx1"/>
-          </a:fontRef>
-        </p:style>
-      </p:cxnSp>
-      <p:sp>
-        <p:nvSpPr>
-          <p:cNvPr id="30" name="TextBox 29"/>
-          <p:cNvSpPr txBox="1"/>
-          <p:nvPr/>
-        </p:nvSpPr>
-        <p:spPr>
-          <a:xfrm>
-            <a:off x="2672179" y="1935332"/>
-            <a:ext cx="1577355" cy="307777"/>
-          </a:xfrm>
-          <a:prstGeom prst="rect">
-            <a:avLst/>
-          </a:prstGeom>
-          <a:noFill/>
-        </p:spPr>
-        <p:txBody>
-          <a:bodyPr wrap="none" rtlCol="0">
-            <a:spAutoFit/>
-          </a:bodyPr>
-          <a:lstStyle/>
-          <a:p>
-            <a:r>
-              <a:rPr lang="en-US" sz="1400" dirty="0" smtClean="0"/>
-              <a:t>Request Happenin’</a:t>
-            </a:r>
-            <a:endParaRPr lang="en-US" sz="1400" dirty="0"/>
-          </a:p>
-        </p:txBody>
-      </p:sp>
-      <p:sp>
-        <p:nvSpPr>
-          <p:cNvPr id="31" name="TextBox 30"/>
-          <p:cNvSpPr txBox="1"/>
-          <p:nvPr/>
-        </p:nvSpPr>
-        <p:spPr>
-          <a:xfrm>
-            <a:off x="5206011" y="2331859"/>
-            <a:ext cx="1577355" cy="307777"/>
-          </a:xfrm>
-          <a:prstGeom prst="rect">
-            <a:avLst/>
-          </a:prstGeom>
-          <a:noFill/>
-        </p:spPr>
-        <p:txBody>
-          <a:bodyPr wrap="none" rtlCol="0">
-            <a:spAutoFit/>
-          </a:bodyPr>
-          <a:lstStyle/>
-          <a:p>
-            <a:r>
-              <a:rPr lang="en-US" sz="1400" dirty="0" smtClean="0"/>
-              <a:t>Request Happenin’</a:t>
-            </a:r>
-            <a:endParaRPr lang="en-US" sz="1400" dirty="0"/>
-          </a:p>
-        </p:txBody>
-      </p:sp>
-      <p:sp>
-        <p:nvSpPr>
-          <p:cNvPr id="32" name="TextBox 31"/>
-          <p:cNvSpPr txBox="1"/>
-          <p:nvPr/>
-        </p:nvSpPr>
-        <p:spPr>
-          <a:xfrm>
-            <a:off x="5406501" y="2929631"/>
-            <a:ext cx="1353256" cy="307777"/>
-          </a:xfrm>
-          <a:prstGeom prst="rect">
-            <a:avLst/>
-          </a:prstGeom>
-          <a:noFill/>
-        </p:spPr>
-        <p:txBody>
-          <a:bodyPr wrap="none" rtlCol="0">
-            <a:spAutoFit/>
-          </a:bodyPr>
-          <a:lstStyle/>
-          <a:p>
-            <a:r>
-              <a:rPr lang="en-US" sz="1400" dirty="0" smtClean="0"/>
-              <a:t>Send Happenin’</a:t>
-            </a:r>
-            <a:endParaRPr lang="en-US" sz="1400" dirty="0"/>
-          </a:p>
-        </p:txBody>
-      </p:sp>
-      <p:sp>
-        <p:nvSpPr>
-          <p:cNvPr id="33" name="TextBox 32"/>
-          <p:cNvSpPr txBox="1"/>
-          <p:nvPr/>
-        </p:nvSpPr>
-        <p:spPr>
-          <a:xfrm>
-            <a:off x="5584054" y="3444536"/>
-            <a:ext cx="1636089" cy="307777"/>
-          </a:xfrm>
-          <a:prstGeom prst="rect">
-            <a:avLst/>
-          </a:prstGeom>
-          <a:noFill/>
-        </p:spPr>
-        <p:txBody>
-          <a:bodyPr wrap="none" rtlCol="0">
-            <a:spAutoFit/>
-          </a:bodyPr>
-          <a:lstStyle/>
-          <a:p>
-            <a:r>
-              <a:rPr lang="en-US" sz="1400" dirty="0" smtClean="0"/>
-              <a:t>Request Comments</a:t>
-            </a:r>
-            <a:endParaRPr lang="en-US" sz="1400" dirty="0"/>
-          </a:p>
-        </p:txBody>
-      </p:sp>
-      <p:sp>
-        <p:nvSpPr>
-          <p:cNvPr id="34" name="TextBox 33"/>
-          <p:cNvSpPr txBox="1"/>
-          <p:nvPr/>
-        </p:nvSpPr>
-        <p:spPr>
-          <a:xfrm>
-            <a:off x="5406501" y="3950563"/>
-            <a:ext cx="1391728" cy="307777"/>
-          </a:xfrm>
-          <a:prstGeom prst="rect">
-            <a:avLst/>
-          </a:prstGeom>
-          <a:noFill/>
-        </p:spPr>
-        <p:txBody>
-          <a:bodyPr wrap="none" rtlCol="0">
-            <a:spAutoFit/>
-          </a:bodyPr>
-          <a:lstStyle/>
-          <a:p>
-            <a:r>
-              <a:rPr lang="en-US" sz="1400" dirty="0" smtClean="0"/>
-              <a:t>Send comments</a:t>
-            </a:r>
-            <a:endParaRPr lang="en-US" sz="1400" dirty="0"/>
-          </a:p>
-        </p:txBody>
-      </p:sp>
-      <p:sp>
-        <p:nvSpPr>
-          <p:cNvPr id="35" name="TextBox 34"/>
-          <p:cNvSpPr txBox="1"/>
-          <p:nvPr/>
-        </p:nvSpPr>
-        <p:spPr>
-          <a:xfrm>
-            <a:off x="5406501" y="4394473"/>
-            <a:ext cx="1503617" cy="307777"/>
-          </a:xfrm>
-          <a:prstGeom prst="rect">
-            <a:avLst/>
-          </a:prstGeom>
-          <a:noFill/>
-        </p:spPr>
-        <p:txBody>
-          <a:bodyPr wrap="none" rtlCol="0">
-            <a:spAutoFit/>
-          </a:bodyPr>
-          <a:lstStyle/>
-          <a:p>
-            <a:r>
-              <a:rPr lang="en-US" sz="1400" dirty="0" smtClean="0"/>
-              <a:t>Request Rankings</a:t>
-            </a:r>
-            <a:endParaRPr lang="en-US" sz="1400" dirty="0"/>
-          </a:p>
-        </p:txBody>
-      </p:sp>
-      <p:sp>
-        <p:nvSpPr>
-          <p:cNvPr id="36" name="TextBox 35"/>
-          <p:cNvSpPr txBox="1"/>
-          <p:nvPr/>
-        </p:nvSpPr>
-        <p:spPr>
-          <a:xfrm>
-            <a:off x="5406501" y="4838330"/>
-            <a:ext cx="1279517" cy="307777"/>
-          </a:xfrm>
-          <a:prstGeom prst="rect">
-            <a:avLst/>
-          </a:prstGeom>
-          <a:noFill/>
-        </p:spPr>
-        <p:txBody>
-          <a:bodyPr wrap="none" rtlCol="0">
-            <a:spAutoFit/>
-          </a:bodyPr>
-          <a:lstStyle/>
-          <a:p>
-            <a:r>
-              <a:rPr lang="en-US" sz="1400" dirty="0" smtClean="0"/>
-              <a:t>Send Rankings</a:t>
-            </a:r>
-            <a:endParaRPr lang="en-US" sz="1400" dirty="0"/>
-          </a:p>
-        </p:txBody>
-      </p:sp>
-      <p:sp>
-        <p:nvSpPr>
-          <p:cNvPr id="37" name="TextBox 36"/>
-          <p:cNvSpPr txBox="1"/>
-          <p:nvPr/>
-        </p:nvSpPr>
-        <p:spPr>
-          <a:xfrm>
-            <a:off x="2672179" y="3000652"/>
-            <a:ext cx="1353256" cy="307777"/>
-          </a:xfrm>
-          <a:prstGeom prst="rect">
-            <a:avLst/>
-          </a:prstGeom>
-          <a:noFill/>
-        </p:spPr>
-        <p:txBody>
-          <a:bodyPr wrap="none" rtlCol="0">
-            <a:spAutoFit/>
-          </a:bodyPr>
-          <a:lstStyle/>
-          <a:p>
-            <a:r>
-              <a:rPr lang="en-US" sz="1400" dirty="0" smtClean="0"/>
-              <a:t>Send Happenin’</a:t>
-            </a:r>
-            <a:endParaRPr lang="en-US" sz="1400" dirty="0"/>
-          </a:p>
-        </p:txBody>
-      </p:sp>
-      <p:sp>
-        <p:nvSpPr>
-          <p:cNvPr id="38" name="TextBox 37"/>
-          <p:cNvSpPr txBox="1"/>
-          <p:nvPr/>
-        </p:nvSpPr>
-        <p:spPr>
-          <a:xfrm>
-            <a:off x="2672179" y="4104451"/>
-            <a:ext cx="1411990" cy="307777"/>
-          </a:xfrm>
-          <a:prstGeom prst="rect">
-            <a:avLst/>
-          </a:prstGeom>
-          <a:noFill/>
-        </p:spPr>
-        <p:txBody>
-          <a:bodyPr wrap="none" rtlCol="0">
-            <a:spAutoFit/>
-          </a:bodyPr>
-          <a:lstStyle/>
-          <a:p>
-            <a:r>
-              <a:rPr lang="en-US" sz="1400" dirty="0" smtClean="0"/>
-              <a:t>Send Comments</a:t>
-            </a:r>
-            <a:endParaRPr lang="en-US" sz="1400" dirty="0"/>
-          </a:p>
-        </p:txBody>
-      </p:sp>
-      <p:sp>
-        <p:nvSpPr>
-          <p:cNvPr id="39" name="TextBox 38"/>
-          <p:cNvSpPr txBox="1"/>
-          <p:nvPr/>
-        </p:nvSpPr>
-        <p:spPr>
-          <a:xfrm>
-            <a:off x="2836440" y="5143112"/>
-            <a:ext cx="1234633" cy="307777"/>
-          </a:xfrm>
-          <a:prstGeom prst="rect">
-            <a:avLst/>
-          </a:prstGeom>
-          <a:noFill/>
-        </p:spPr>
-        <p:txBody>
-          <a:bodyPr wrap="none" rtlCol="0">
-            <a:spAutoFit/>
-          </a:bodyPr>
-          <a:lstStyle/>
-          <a:p>
-            <a:r>
-              <a:rPr lang="en-US" sz="1400" dirty="0" smtClean="0"/>
-              <a:t>Send rankings</a:t>
-            </a:r>
-            <a:endParaRPr lang="en-US" sz="1400" dirty="0"/>
-          </a:p>
-        </p:txBody>
-      </p:sp>
-      <p:cxnSp>
-        <p:nvCxnSpPr>
-          <p:cNvPr id="41" name="Straight Arrow Connector 40"/>
-          <p:cNvCxnSpPr/>
-          <p:nvPr/>
-        </p:nvCxnSpPr>
-        <p:spPr>
-          <a:xfrm>
-            <a:off x="2506514" y="3598424"/>
-            <a:ext cx="1969311" cy="0"/>
-          </a:xfrm>
-          <a:prstGeom prst="straightConnector1">
-            <a:avLst/>
-          </a:prstGeom>
-          <a:ln>
-            <a:tailEnd type="arrow"/>
-          </a:ln>
-        </p:spPr>
-        <p:style>
-          <a:lnRef idx="1">
-            <a:schemeClr val="accent1"/>
-          </a:lnRef>
-          <a:fillRef idx="0">
-            <a:schemeClr val="accent1"/>
-          </a:fillRef>
-          <a:effectRef idx="0">
-            <a:schemeClr val="accent1"/>
-          </a:effectRef>
-          <a:fontRef idx="minor">
-            <a:schemeClr val="tx1"/>
-          </a:fontRef>
-        </p:style>
-      </p:cxnSp>
-      <p:sp>
-        <p:nvSpPr>
-          <p:cNvPr id="43" name="TextBox 42"/>
-          <p:cNvSpPr txBox="1"/>
-          <p:nvPr/>
-        </p:nvSpPr>
-        <p:spPr>
-          <a:xfrm>
-            <a:off x="2673124" y="3642786"/>
-            <a:ext cx="1636089" cy="307777"/>
-          </a:xfrm>
-          <a:prstGeom prst="rect">
-            <a:avLst/>
-          </a:prstGeom>
-          <a:noFill/>
-        </p:spPr>
-        <p:txBody>
-          <a:bodyPr wrap="none" rtlCol="0">
-            <a:spAutoFit/>
-          </a:bodyPr>
-          <a:lstStyle/>
-          <a:p>
-            <a:r>
-              <a:rPr lang="en-US" sz="1400" dirty="0" smtClean="0"/>
-              <a:t>Request Comments</a:t>
-            </a:r>
-            <a:endParaRPr lang="en-US" sz="1400" dirty="0"/>
-          </a:p>
-        </p:txBody>
-      </p:sp>
-      <p:cxnSp>
-        <p:nvCxnSpPr>
-          <p:cNvPr id="45" name="Straight Arrow Connector 44"/>
-          <p:cNvCxnSpPr/>
-          <p:nvPr/>
-        </p:nvCxnSpPr>
-        <p:spPr>
-          <a:xfrm>
-            <a:off x="2506514" y="4622325"/>
-            <a:ext cx="1969311" cy="0"/>
-          </a:xfrm>
-          <a:prstGeom prst="straightConnector1">
-            <a:avLst/>
-          </a:prstGeom>
-          <a:ln>
-            <a:tailEnd type="arrow"/>
-          </a:ln>
-        </p:spPr>
-        <p:style>
-          <a:lnRef idx="1">
-            <a:schemeClr val="accent1"/>
-          </a:lnRef>
-          <a:fillRef idx="0">
-            <a:schemeClr val="accent1"/>
-          </a:fillRef>
-          <a:effectRef idx="0">
-            <a:schemeClr val="accent1"/>
-          </a:effectRef>
-          <a:fontRef idx="minor">
-            <a:schemeClr val="tx1"/>
-          </a:fontRef>
-        </p:style>
-      </p:cxnSp>
-      <p:sp>
-        <p:nvSpPr>
-          <p:cNvPr id="46" name="TextBox 45"/>
-          <p:cNvSpPr txBox="1"/>
-          <p:nvPr/>
-        </p:nvSpPr>
-        <p:spPr>
-          <a:xfrm>
-            <a:off x="2718672" y="4631203"/>
-            <a:ext cx="1503617" cy="307777"/>
-          </a:xfrm>
-          <a:prstGeom prst="rect">
-            <a:avLst/>
-          </a:prstGeom>
-          <a:noFill/>
-        </p:spPr>
-        <p:txBody>
-          <a:bodyPr wrap="none" rtlCol="0">
-            <a:spAutoFit/>
-          </a:bodyPr>
-          <a:lstStyle/>
-          <a:p>
-            <a:r>
-              <a:rPr lang="en-US" sz="1400" dirty="0" smtClean="0"/>
-              <a:t>Request Rankings</a:t>
-            </a:r>
-            <a:endParaRPr lang="en-US" sz="1400" dirty="0"/>
-          </a:p>
-        </p:txBody>
-      </p:sp>
-    </p:spTree>
-    <p:extLst>
-      <p:ext uri="{BB962C8B-B14F-4D97-AF65-F5344CB8AC3E}">
-        <p14:creationId xmlns:p14="http://schemas.microsoft.com/office/powerpoint/2010/main" val="1944259841"/>
       </p:ext>
     </p:extLst>
   </p:cSld>
@@ -8460,44 +8438,1329 @@
           <a:bodyPr/>
           <a:lstStyle/>
           <a:p>
+            <a:r>
+              <a:rPr lang="en-US" dirty="0" smtClean="0"/>
+              <a:t>View Happenin’</a:t>
+            </a:r>
             <a:endParaRPr lang="en-US" dirty="0"/>
           </a:p>
         </p:txBody>
       </p:sp>
       <p:sp>
         <p:nvSpPr>
-          <p:cNvPr id="4" name="Text Placeholder 3"/>
+          <p:cNvPr id="4" name="Rectangle 3"/>
+          <p:cNvSpPr/>
+          <p:nvPr/>
+        </p:nvSpPr>
+        <p:spPr>
+          <a:xfrm>
+            <a:off x="1849567" y="1802167"/>
+            <a:ext cx="656947" cy="4296792"/>
+          </a:xfrm>
+          <a:prstGeom prst="rect">
+            <a:avLst/>
+          </a:prstGeom>
+        </p:spPr>
+        <p:style>
+          <a:lnRef idx="2">
+            <a:schemeClr val="accent1">
+              <a:shade val="50000"/>
+            </a:schemeClr>
+          </a:lnRef>
+          <a:fillRef idx="1">
+            <a:schemeClr val="accent1"/>
+          </a:fillRef>
+          <a:effectRef idx="0">
+            <a:schemeClr val="accent1"/>
+          </a:effectRef>
+          <a:fontRef idx="minor">
+            <a:schemeClr val="lt1"/>
+          </a:fontRef>
+        </p:style>
+        <p:txBody>
+          <a:bodyPr rtlCol="0" anchor="ctr"/>
+          <a:lstStyle/>
+          <a:p>
+            <a:pPr algn="ctr"/>
+            <a:endParaRPr lang="en-US"/>
+          </a:p>
+        </p:txBody>
+      </p:sp>
+      <p:sp>
+        <p:nvSpPr>
+          <p:cNvPr id="5" name="Rectangle 4"/>
+          <p:cNvSpPr/>
+          <p:nvPr/>
+        </p:nvSpPr>
+        <p:spPr>
+          <a:xfrm>
+            <a:off x="4475825" y="1802167"/>
+            <a:ext cx="656947" cy="4296792"/>
+          </a:xfrm>
+          <a:prstGeom prst="rect">
+            <a:avLst/>
+          </a:prstGeom>
+        </p:spPr>
+        <p:style>
+          <a:lnRef idx="2">
+            <a:schemeClr val="accent1">
+              <a:shade val="50000"/>
+            </a:schemeClr>
+          </a:lnRef>
+          <a:fillRef idx="1">
+            <a:schemeClr val="accent1"/>
+          </a:fillRef>
+          <a:effectRef idx="0">
+            <a:schemeClr val="accent1"/>
+          </a:effectRef>
+          <a:fontRef idx="minor">
+            <a:schemeClr val="lt1"/>
+          </a:fontRef>
+        </p:style>
+        <p:txBody>
+          <a:bodyPr rtlCol="0" anchor="ctr"/>
+          <a:lstStyle/>
+          <a:p>
+            <a:pPr algn="ctr"/>
+            <a:endParaRPr lang="en-US"/>
+          </a:p>
+        </p:txBody>
+      </p:sp>
+      <p:sp>
+        <p:nvSpPr>
+          <p:cNvPr id="6" name="Rectangle 5"/>
+          <p:cNvSpPr/>
+          <p:nvPr/>
+        </p:nvSpPr>
+        <p:spPr>
+          <a:xfrm>
+            <a:off x="7344792" y="1802167"/>
+            <a:ext cx="656947" cy="4296792"/>
+          </a:xfrm>
+          <a:prstGeom prst="rect">
+            <a:avLst/>
+          </a:prstGeom>
+        </p:spPr>
+        <p:style>
+          <a:lnRef idx="2">
+            <a:schemeClr val="accent1">
+              <a:shade val="50000"/>
+            </a:schemeClr>
+          </a:lnRef>
+          <a:fillRef idx="1">
+            <a:schemeClr val="accent1"/>
+          </a:fillRef>
+          <a:effectRef idx="0">
+            <a:schemeClr val="accent1"/>
+          </a:effectRef>
+          <a:fontRef idx="minor">
+            <a:schemeClr val="lt1"/>
+          </a:fontRef>
+        </p:style>
+        <p:txBody>
+          <a:bodyPr rtlCol="0" anchor="ctr"/>
+          <a:lstStyle/>
+          <a:p>
+            <a:pPr algn="ctr"/>
+            <a:endParaRPr lang="en-US"/>
+          </a:p>
+        </p:txBody>
+      </p:sp>
+      <p:sp>
+        <p:nvSpPr>
+          <p:cNvPr id="7" name="TextBox 6"/>
+          <p:cNvSpPr txBox="1"/>
+          <p:nvPr/>
+        </p:nvSpPr>
+        <p:spPr>
+          <a:xfrm>
+            <a:off x="1890942" y="1349406"/>
+            <a:ext cx="625492" cy="369332"/>
+          </a:xfrm>
+          <a:prstGeom prst="rect">
+            <a:avLst/>
+          </a:prstGeom>
+          <a:noFill/>
+        </p:spPr>
+        <p:txBody>
+          <a:bodyPr wrap="none" rtlCol="0">
+            <a:spAutoFit/>
+          </a:bodyPr>
+          <a:lstStyle/>
+          <a:p>
+            <a:r>
+              <a:rPr lang="en-US" dirty="0" smtClean="0"/>
+              <a:t>User</a:t>
+            </a:r>
+            <a:endParaRPr lang="en-US" dirty="0"/>
+          </a:p>
+        </p:txBody>
+      </p:sp>
+      <p:sp>
+        <p:nvSpPr>
+          <p:cNvPr id="8" name="TextBox 7"/>
+          <p:cNvSpPr txBox="1"/>
+          <p:nvPr/>
+        </p:nvSpPr>
+        <p:spPr>
+          <a:xfrm>
+            <a:off x="4517201" y="1349406"/>
+            <a:ext cx="574196" cy="369332"/>
+          </a:xfrm>
+          <a:prstGeom prst="rect">
+            <a:avLst/>
+          </a:prstGeom>
+          <a:noFill/>
+        </p:spPr>
+        <p:txBody>
+          <a:bodyPr wrap="none" rtlCol="0">
+            <a:spAutoFit/>
+          </a:bodyPr>
+          <a:lstStyle/>
+          <a:p>
+            <a:pPr algn="ctr"/>
+            <a:r>
+              <a:rPr lang="en-US" dirty="0" smtClean="0"/>
+              <a:t>App</a:t>
+            </a:r>
+            <a:endParaRPr lang="en-US" dirty="0"/>
+          </a:p>
+        </p:txBody>
+      </p:sp>
+      <p:sp>
+        <p:nvSpPr>
+          <p:cNvPr id="9" name="TextBox 8"/>
+          <p:cNvSpPr txBox="1"/>
+          <p:nvPr/>
+        </p:nvSpPr>
+        <p:spPr>
+          <a:xfrm>
+            <a:off x="7435059" y="1317140"/>
+            <a:ext cx="476413" cy="369332"/>
+          </a:xfrm>
+          <a:prstGeom prst="rect">
+            <a:avLst/>
+          </a:prstGeom>
+          <a:noFill/>
+        </p:spPr>
+        <p:txBody>
+          <a:bodyPr wrap="none" rtlCol="0">
+            <a:spAutoFit/>
+          </a:bodyPr>
+          <a:lstStyle/>
+          <a:p>
+            <a:pPr algn="ctr"/>
+            <a:r>
+              <a:rPr lang="en-US" dirty="0" smtClean="0"/>
+              <a:t>DB</a:t>
+            </a:r>
+            <a:endParaRPr lang="en-US" dirty="0"/>
+          </a:p>
+        </p:txBody>
+      </p:sp>
+      <p:cxnSp>
+        <p:nvCxnSpPr>
+          <p:cNvPr id="11" name="Straight Arrow Connector 10"/>
+          <p:cNvCxnSpPr/>
+          <p:nvPr/>
+        </p:nvCxnSpPr>
+        <p:spPr>
+          <a:xfrm>
+            <a:off x="2516434" y="2263893"/>
+            <a:ext cx="1969311" cy="0"/>
+          </a:xfrm>
+          <a:prstGeom prst="straightConnector1">
+            <a:avLst/>
+          </a:prstGeom>
+          <a:ln>
+            <a:tailEnd type="arrow"/>
+          </a:ln>
+        </p:spPr>
+        <p:style>
+          <a:lnRef idx="1">
+            <a:schemeClr val="accent1"/>
+          </a:lnRef>
+          <a:fillRef idx="0">
+            <a:schemeClr val="accent1"/>
+          </a:fillRef>
+          <a:effectRef idx="0">
+            <a:schemeClr val="accent1"/>
+          </a:effectRef>
+          <a:fontRef idx="minor">
+            <a:schemeClr val="tx1"/>
+          </a:fontRef>
+        </p:style>
+      </p:cxnSp>
+      <p:cxnSp>
+        <p:nvCxnSpPr>
+          <p:cNvPr id="13" name="Straight Arrow Connector 12"/>
+          <p:cNvCxnSpPr/>
+          <p:nvPr/>
+        </p:nvCxnSpPr>
+        <p:spPr>
+          <a:xfrm flipV="1">
+            <a:off x="5132772" y="3640649"/>
+            <a:ext cx="2212020" cy="7337"/>
+          </a:xfrm>
+          <a:prstGeom prst="straightConnector1">
+            <a:avLst/>
+          </a:prstGeom>
+          <a:ln>
+            <a:tailEnd type="arrow"/>
+          </a:ln>
+        </p:spPr>
+        <p:style>
+          <a:lnRef idx="1">
+            <a:schemeClr val="accent1"/>
+          </a:lnRef>
+          <a:fillRef idx="0">
+            <a:schemeClr val="accent1"/>
+          </a:fillRef>
+          <a:effectRef idx="0">
+            <a:schemeClr val="accent1"/>
+          </a:effectRef>
+          <a:fontRef idx="minor">
+            <a:schemeClr val="tx1"/>
+          </a:fontRef>
+        </p:style>
+      </p:cxnSp>
+      <p:cxnSp>
+        <p:nvCxnSpPr>
+          <p:cNvPr id="15" name="Straight Arrow Connector 14"/>
+          <p:cNvCxnSpPr/>
+          <p:nvPr/>
+        </p:nvCxnSpPr>
+        <p:spPr>
+          <a:xfrm flipH="1">
+            <a:off x="5132772" y="4221548"/>
+            <a:ext cx="2212020" cy="44024"/>
+          </a:xfrm>
+          <a:prstGeom prst="straightConnector1">
+            <a:avLst/>
+          </a:prstGeom>
+          <a:ln>
+            <a:tailEnd type="arrow"/>
+          </a:ln>
+        </p:spPr>
+        <p:style>
+          <a:lnRef idx="1">
+            <a:schemeClr val="accent1"/>
+          </a:lnRef>
+          <a:fillRef idx="0">
+            <a:schemeClr val="accent1"/>
+          </a:fillRef>
+          <a:effectRef idx="0">
+            <a:schemeClr val="accent1"/>
+          </a:effectRef>
+          <a:fontRef idx="minor">
+            <a:schemeClr val="tx1"/>
+          </a:fontRef>
+        </p:style>
+      </p:cxnSp>
+      <p:cxnSp>
+        <p:nvCxnSpPr>
+          <p:cNvPr id="27" name="Straight Arrow Connector 26"/>
+          <p:cNvCxnSpPr/>
+          <p:nvPr/>
+        </p:nvCxnSpPr>
+        <p:spPr>
+          <a:xfrm flipH="1" flipV="1">
+            <a:off x="2506514" y="4421117"/>
+            <a:ext cx="1969311" cy="17755"/>
+          </a:xfrm>
+          <a:prstGeom prst="straightConnector1">
+            <a:avLst/>
+          </a:prstGeom>
+          <a:ln>
+            <a:tailEnd type="arrow"/>
+          </a:ln>
+        </p:spPr>
+        <p:style>
+          <a:lnRef idx="1">
+            <a:schemeClr val="accent1"/>
+          </a:lnRef>
+          <a:fillRef idx="0">
+            <a:schemeClr val="accent1"/>
+          </a:fillRef>
+          <a:effectRef idx="0">
+            <a:schemeClr val="accent1"/>
+          </a:effectRef>
+          <a:fontRef idx="minor">
+            <a:schemeClr val="tx1"/>
+          </a:fontRef>
+        </p:style>
+      </p:cxnSp>
+      <p:sp>
+        <p:nvSpPr>
+          <p:cNvPr id="30" name="TextBox 29"/>
+          <p:cNvSpPr txBox="1"/>
+          <p:nvPr/>
+        </p:nvSpPr>
+        <p:spPr>
+          <a:xfrm>
+            <a:off x="2713857" y="3101355"/>
+            <a:ext cx="1439818" cy="307777"/>
+          </a:xfrm>
+          <a:prstGeom prst="rect">
+            <a:avLst/>
+          </a:prstGeom>
+          <a:noFill/>
+        </p:spPr>
+        <p:txBody>
+          <a:bodyPr wrap="none" rtlCol="0">
+            <a:spAutoFit/>
+          </a:bodyPr>
+          <a:lstStyle/>
+          <a:p>
+            <a:r>
+              <a:rPr lang="en-US" sz="1400" dirty="0" smtClean="0"/>
+              <a:t>Select </a:t>
+            </a:r>
+            <a:r>
+              <a:rPr lang="en-US" sz="1400" dirty="0" err="1" smtClean="0"/>
+              <a:t>Happenin</a:t>
+            </a:r>
+            <a:r>
+              <a:rPr lang="en-US" sz="1400" dirty="0" smtClean="0"/>
+              <a:t>’</a:t>
+            </a:r>
+            <a:endParaRPr lang="en-US" sz="1400" dirty="0"/>
+          </a:p>
+        </p:txBody>
+      </p:sp>
+      <p:sp>
+        <p:nvSpPr>
+          <p:cNvPr id="31" name="TextBox 30"/>
+          <p:cNvSpPr txBox="1"/>
+          <p:nvPr/>
+        </p:nvSpPr>
+        <p:spPr>
+          <a:xfrm>
+            <a:off x="5206011" y="3255244"/>
+            <a:ext cx="1907573" cy="307777"/>
+          </a:xfrm>
+          <a:prstGeom prst="rect">
+            <a:avLst/>
+          </a:prstGeom>
+          <a:noFill/>
+        </p:spPr>
+        <p:txBody>
+          <a:bodyPr wrap="none" rtlCol="0">
+            <a:spAutoFit/>
+          </a:bodyPr>
+          <a:lstStyle/>
+          <a:p>
+            <a:r>
+              <a:rPr lang="en-US" sz="1400" dirty="0" smtClean="0"/>
+              <a:t>Request </a:t>
+            </a:r>
+            <a:r>
+              <a:rPr lang="en-US" sz="1400" dirty="0" err="1" smtClean="0"/>
+              <a:t>Happenin</a:t>
+            </a:r>
+            <a:r>
+              <a:rPr lang="en-US" sz="1400" dirty="0" smtClean="0"/>
+              <a:t>’ info</a:t>
+            </a:r>
+            <a:endParaRPr lang="en-US" sz="1400" dirty="0"/>
+          </a:p>
+        </p:txBody>
+      </p:sp>
+      <p:sp>
+        <p:nvSpPr>
+          <p:cNvPr id="32" name="TextBox 31"/>
+          <p:cNvSpPr txBox="1"/>
+          <p:nvPr/>
+        </p:nvSpPr>
+        <p:spPr>
+          <a:xfrm>
+            <a:off x="5406501" y="3853016"/>
+            <a:ext cx="1683474" cy="307777"/>
+          </a:xfrm>
+          <a:prstGeom prst="rect">
+            <a:avLst/>
+          </a:prstGeom>
+          <a:noFill/>
+        </p:spPr>
+        <p:txBody>
+          <a:bodyPr wrap="none" rtlCol="0">
+            <a:spAutoFit/>
+          </a:bodyPr>
+          <a:lstStyle/>
+          <a:p>
+            <a:r>
+              <a:rPr lang="en-US" sz="1400" dirty="0" smtClean="0"/>
+              <a:t>Send </a:t>
+            </a:r>
+            <a:r>
+              <a:rPr lang="en-US" sz="1400" dirty="0" err="1" smtClean="0"/>
+              <a:t>Happenin</a:t>
+            </a:r>
+            <a:r>
+              <a:rPr lang="en-US" sz="1400" dirty="0" smtClean="0"/>
+              <a:t>’ info</a:t>
+            </a:r>
+            <a:endParaRPr lang="en-US" sz="1400" dirty="0"/>
+          </a:p>
+        </p:txBody>
+      </p:sp>
+      <p:sp>
+        <p:nvSpPr>
+          <p:cNvPr id="37" name="TextBox 36"/>
+          <p:cNvSpPr txBox="1"/>
+          <p:nvPr/>
+        </p:nvSpPr>
+        <p:spPr>
+          <a:xfrm>
+            <a:off x="2672179" y="3994988"/>
+            <a:ext cx="1523174" cy="307777"/>
+          </a:xfrm>
+          <a:prstGeom prst="rect">
+            <a:avLst/>
+          </a:prstGeom>
+          <a:noFill/>
+        </p:spPr>
+        <p:txBody>
+          <a:bodyPr wrap="none" rtlCol="0">
+            <a:spAutoFit/>
+          </a:bodyPr>
+          <a:lstStyle/>
+          <a:p>
+            <a:r>
+              <a:rPr lang="en-US" sz="1400" dirty="0" smtClean="0"/>
+              <a:t>Display </a:t>
+            </a:r>
+            <a:r>
+              <a:rPr lang="en-US" sz="1400" dirty="0" err="1" smtClean="0"/>
+              <a:t>Happenin</a:t>
+            </a:r>
+            <a:r>
+              <a:rPr lang="en-US" sz="1400" dirty="0" smtClean="0"/>
+              <a:t>’</a:t>
+            </a:r>
+            <a:endParaRPr lang="en-US" sz="1400" dirty="0"/>
+          </a:p>
+        </p:txBody>
+      </p:sp>
+      <p:sp>
+        <p:nvSpPr>
+          <p:cNvPr id="40" name="TextBox 39"/>
+          <p:cNvSpPr txBox="1"/>
+          <p:nvPr/>
+        </p:nvSpPr>
+        <p:spPr>
+          <a:xfrm>
+            <a:off x="2755535" y="1821489"/>
+            <a:ext cx="1649041" cy="307777"/>
+          </a:xfrm>
+          <a:prstGeom prst="rect">
+            <a:avLst/>
+          </a:prstGeom>
+          <a:noFill/>
+        </p:spPr>
+        <p:txBody>
+          <a:bodyPr wrap="none" rtlCol="0">
+            <a:spAutoFit/>
+          </a:bodyPr>
+          <a:lstStyle/>
+          <a:p>
+            <a:r>
+              <a:rPr lang="en-US" sz="1400" dirty="0" smtClean="0"/>
+              <a:t>Request </a:t>
+            </a:r>
+            <a:r>
+              <a:rPr lang="en-US" sz="1400" dirty="0" err="1" smtClean="0"/>
+              <a:t>Happenins</a:t>
+            </a:r>
+            <a:endParaRPr lang="en-US" sz="1400" dirty="0"/>
+          </a:p>
+        </p:txBody>
+      </p:sp>
+      <p:cxnSp>
+        <p:nvCxnSpPr>
+          <p:cNvPr id="42" name="Straight Arrow Connector 41"/>
+          <p:cNvCxnSpPr/>
+          <p:nvPr/>
+        </p:nvCxnSpPr>
+        <p:spPr>
+          <a:xfrm>
+            <a:off x="2506619" y="3511173"/>
+            <a:ext cx="1969311" cy="0"/>
+          </a:xfrm>
+          <a:prstGeom prst="straightConnector1">
+            <a:avLst/>
+          </a:prstGeom>
+          <a:ln>
+            <a:tailEnd type="arrow"/>
+          </a:ln>
+        </p:spPr>
+        <p:style>
+          <a:lnRef idx="1">
+            <a:schemeClr val="accent1"/>
+          </a:lnRef>
+          <a:fillRef idx="0">
+            <a:schemeClr val="accent1"/>
+          </a:fillRef>
+          <a:effectRef idx="0">
+            <a:schemeClr val="accent1"/>
+          </a:effectRef>
+          <a:fontRef idx="minor">
+            <a:schemeClr val="tx1"/>
+          </a:fontRef>
+        </p:style>
+      </p:cxnSp>
+      <p:cxnSp>
+        <p:nvCxnSpPr>
+          <p:cNvPr id="44" name="Straight Arrow Connector 43"/>
+          <p:cNvCxnSpPr/>
+          <p:nvPr/>
+        </p:nvCxnSpPr>
+        <p:spPr>
+          <a:xfrm>
+            <a:off x="5123894" y="2411872"/>
+            <a:ext cx="2212020" cy="0"/>
+          </a:xfrm>
+          <a:prstGeom prst="straightConnector1">
+            <a:avLst/>
+          </a:prstGeom>
+          <a:ln>
+            <a:tailEnd type="arrow"/>
+          </a:ln>
+        </p:spPr>
+        <p:style>
+          <a:lnRef idx="1">
+            <a:schemeClr val="accent1"/>
+          </a:lnRef>
+          <a:fillRef idx="0">
+            <a:schemeClr val="accent1"/>
+          </a:fillRef>
+          <a:effectRef idx="0">
+            <a:schemeClr val="accent1"/>
+          </a:effectRef>
+          <a:fontRef idx="minor">
+            <a:schemeClr val="tx1"/>
+          </a:fontRef>
+        </p:style>
+      </p:cxnSp>
+      <p:sp>
+        <p:nvSpPr>
+          <p:cNvPr id="47" name="TextBox 46"/>
+          <p:cNvSpPr txBox="1"/>
+          <p:nvPr/>
+        </p:nvSpPr>
+        <p:spPr>
+          <a:xfrm>
+            <a:off x="5279384" y="2092415"/>
+            <a:ext cx="1918795" cy="307777"/>
+          </a:xfrm>
+          <a:prstGeom prst="rect">
+            <a:avLst/>
+          </a:prstGeom>
+          <a:noFill/>
+        </p:spPr>
+        <p:txBody>
+          <a:bodyPr wrap="none" rtlCol="0">
+            <a:spAutoFit/>
+          </a:bodyPr>
+          <a:lstStyle/>
+          <a:p>
+            <a:r>
+              <a:rPr lang="en-US" sz="1400" dirty="0" smtClean="0"/>
+              <a:t>Request </a:t>
+            </a:r>
+            <a:r>
+              <a:rPr lang="en-US" sz="1400" dirty="0" err="1" smtClean="0"/>
+              <a:t>Happenins</a:t>
+            </a:r>
+            <a:r>
+              <a:rPr lang="en-US" sz="1400" dirty="0" smtClean="0"/>
+              <a:t> List</a:t>
+            </a:r>
+            <a:endParaRPr lang="en-US" sz="1400" dirty="0"/>
+          </a:p>
+        </p:txBody>
+      </p:sp>
+      <p:cxnSp>
+        <p:nvCxnSpPr>
+          <p:cNvPr id="48" name="Straight Arrow Connector 47"/>
+          <p:cNvCxnSpPr/>
+          <p:nvPr/>
+        </p:nvCxnSpPr>
+        <p:spPr>
+          <a:xfrm flipH="1">
+            <a:off x="5132773" y="2877932"/>
+            <a:ext cx="2212019" cy="1"/>
+          </a:xfrm>
+          <a:prstGeom prst="straightConnector1">
+            <a:avLst/>
+          </a:prstGeom>
+          <a:ln>
+            <a:tailEnd type="arrow"/>
+          </a:ln>
+        </p:spPr>
+        <p:style>
+          <a:lnRef idx="1">
+            <a:schemeClr val="accent1"/>
+          </a:lnRef>
+          <a:fillRef idx="0">
+            <a:schemeClr val="accent1"/>
+          </a:fillRef>
+          <a:effectRef idx="0">
+            <a:schemeClr val="accent1"/>
+          </a:effectRef>
+          <a:fontRef idx="minor">
+            <a:schemeClr val="tx1"/>
+          </a:fontRef>
+        </p:style>
+      </p:cxnSp>
+      <p:sp>
+        <p:nvSpPr>
+          <p:cNvPr id="50" name="TextBox 49"/>
+          <p:cNvSpPr txBox="1"/>
+          <p:nvPr/>
+        </p:nvSpPr>
+        <p:spPr>
+          <a:xfrm>
+            <a:off x="5382556" y="2570155"/>
+            <a:ext cx="1694695" cy="307777"/>
+          </a:xfrm>
+          <a:prstGeom prst="rect">
+            <a:avLst/>
+          </a:prstGeom>
+          <a:noFill/>
+        </p:spPr>
+        <p:txBody>
+          <a:bodyPr wrap="none" rtlCol="0">
+            <a:spAutoFit/>
+          </a:bodyPr>
+          <a:lstStyle/>
+          <a:p>
+            <a:r>
+              <a:rPr lang="en-US" sz="1400" dirty="0" smtClean="0"/>
+              <a:t>Send </a:t>
+            </a:r>
+            <a:r>
+              <a:rPr lang="en-US" sz="1400" dirty="0" err="1" smtClean="0"/>
+              <a:t>Happenins</a:t>
+            </a:r>
+            <a:r>
+              <a:rPr lang="en-US" sz="1400" dirty="0" smtClean="0"/>
+              <a:t> List</a:t>
+            </a:r>
+            <a:endParaRPr lang="en-US" sz="1400" dirty="0"/>
+          </a:p>
+        </p:txBody>
+      </p:sp>
+      <p:cxnSp>
+        <p:nvCxnSpPr>
+          <p:cNvPr id="51" name="Straight Arrow Connector 50"/>
+          <p:cNvCxnSpPr/>
+          <p:nvPr/>
+        </p:nvCxnSpPr>
+        <p:spPr>
+          <a:xfrm flipH="1" flipV="1">
+            <a:off x="2506513" y="3002220"/>
+            <a:ext cx="1969311" cy="17755"/>
+          </a:xfrm>
+          <a:prstGeom prst="straightConnector1">
+            <a:avLst/>
+          </a:prstGeom>
+          <a:ln>
+            <a:tailEnd type="arrow"/>
+          </a:ln>
+        </p:spPr>
+        <p:style>
+          <a:lnRef idx="1">
+            <a:schemeClr val="accent1"/>
+          </a:lnRef>
+          <a:fillRef idx="0">
+            <a:schemeClr val="accent1"/>
+          </a:fillRef>
+          <a:effectRef idx="0">
+            <a:schemeClr val="accent1"/>
+          </a:effectRef>
+          <a:fontRef idx="minor">
+            <a:schemeClr val="tx1"/>
+          </a:fontRef>
+        </p:style>
+      </p:cxnSp>
+      <p:sp>
+        <p:nvSpPr>
+          <p:cNvPr id="52" name="TextBox 51"/>
+          <p:cNvSpPr txBox="1"/>
+          <p:nvPr/>
+        </p:nvSpPr>
+        <p:spPr>
+          <a:xfrm>
+            <a:off x="2896599" y="2712198"/>
+            <a:ext cx="1074333" cy="307777"/>
+          </a:xfrm>
+          <a:prstGeom prst="rect">
+            <a:avLst/>
+          </a:prstGeom>
+          <a:noFill/>
+        </p:spPr>
+        <p:txBody>
+          <a:bodyPr wrap="none" rtlCol="0">
+            <a:spAutoFit/>
+          </a:bodyPr>
+          <a:lstStyle/>
+          <a:p>
+            <a:r>
+              <a:rPr lang="en-US" sz="1400" dirty="0" smtClean="0"/>
+              <a:t>Display List</a:t>
+            </a:r>
+            <a:endParaRPr lang="en-US" sz="1400" dirty="0"/>
+          </a:p>
+        </p:txBody>
+      </p:sp>
+    </p:spTree>
+    <p:extLst>
+      <p:ext uri="{BB962C8B-B14F-4D97-AF65-F5344CB8AC3E}">
+        <p14:creationId xmlns:p14="http://schemas.microsoft.com/office/powerpoint/2010/main" val="1944259841"/>
+      </p:ext>
+    </p:extLst>
+  </p:cSld>
+  <p:clrMapOvr>
+    <a:masterClrMapping/>
+  </p:clrMapOvr>
+  <p:timing>
+    <p:tnLst>
+      <p:par>
+        <p:cTn id="1" dur="indefinite" restart="never" nodeType="tmRoot"/>
+      </p:par>
+    </p:tnLst>
+  </p:timing>
+</p:sld>
+</file>
+
+<file path=ppt/slides/slide9.xml><?xml version="1.0" encoding="utf-8"?>
+<p:sld xmlns:a="http://schemas.openxmlformats.org/drawingml/2006/main" xmlns:r="http://schemas.openxmlformats.org/officeDocument/2006/relationships" xmlns:p="http://schemas.openxmlformats.org/presentationml/2006/main">
+  <p:cSld>
+    <p:spTree>
+      <p:nvGrpSpPr>
+        <p:cNvPr id="1" name=""/>
+        <p:cNvGrpSpPr/>
+        <p:nvPr/>
+      </p:nvGrpSpPr>
+      <p:grpSpPr>
+        <a:xfrm>
+          <a:off x="0" y="0"/>
+          <a:ext cx="0" cy="0"/>
+          <a:chOff x="0" y="0"/>
+          <a:chExt cx="0" cy="0"/>
+        </a:xfrm>
+      </p:grpSpPr>
+      <p:sp>
+        <p:nvSpPr>
+          <p:cNvPr id="2" name="Title 1"/>
           <p:cNvSpPr>
             <a:spLocks noGrp="1"/>
           </p:cNvSpPr>
           <p:nvPr>
-            <p:ph type="body" idx="1"/>
+            <p:ph type="title"/>
           </p:nvPr>
         </p:nvSpPr>
         <p:spPr>
           <a:xfrm>
-            <a:off x="722313" y="2325951"/>
-            <a:ext cx="7772400" cy="1216240"/>
+            <a:off x="163774" y="329236"/>
+            <a:ext cx="8980226" cy="776233"/>
           </a:xfrm>
         </p:spPr>
         <p:txBody>
           <a:bodyPr>
-            <a:normAutofit/>
+            <a:noAutofit/>
           </a:bodyPr>
           <a:lstStyle/>
           <a:p>
             <a:r>
-              <a:rPr lang="en-US" sz="4000" b="1" dirty="0" smtClean="0"/>
-              <a:t>QUESTIONS?</a:t>
-            </a:r>
-            <a:endParaRPr lang="en-US" sz="4000" b="1" dirty="0"/>
+              <a:rPr lang="en-US" sz="4000" dirty="0" smtClean="0"/>
+              <a:t>Create New User w/Existing Username</a:t>
+            </a:r>
+            <a:endParaRPr lang="en-US" sz="4000" dirty="0"/>
+          </a:p>
+        </p:txBody>
+      </p:sp>
+      <p:sp>
+        <p:nvSpPr>
+          <p:cNvPr id="4" name="Rectangle 3"/>
+          <p:cNvSpPr/>
+          <p:nvPr/>
+        </p:nvSpPr>
+        <p:spPr>
+          <a:xfrm>
+            <a:off x="1849567" y="1802167"/>
+            <a:ext cx="656947" cy="4296792"/>
+          </a:xfrm>
+          <a:prstGeom prst="rect">
+            <a:avLst/>
+          </a:prstGeom>
+        </p:spPr>
+        <p:style>
+          <a:lnRef idx="2">
+            <a:schemeClr val="accent1">
+              <a:shade val="50000"/>
+            </a:schemeClr>
+          </a:lnRef>
+          <a:fillRef idx="1">
+            <a:schemeClr val="accent1"/>
+          </a:fillRef>
+          <a:effectRef idx="0">
+            <a:schemeClr val="accent1"/>
+          </a:effectRef>
+          <a:fontRef idx="minor">
+            <a:schemeClr val="lt1"/>
+          </a:fontRef>
+        </p:style>
+        <p:txBody>
+          <a:bodyPr rtlCol="0" anchor="ctr"/>
+          <a:lstStyle/>
+          <a:p>
+            <a:pPr algn="ctr"/>
+            <a:endParaRPr lang="en-US"/>
+          </a:p>
+        </p:txBody>
+      </p:sp>
+      <p:sp>
+        <p:nvSpPr>
+          <p:cNvPr id="5" name="Rectangle 4"/>
+          <p:cNvSpPr/>
+          <p:nvPr/>
+        </p:nvSpPr>
+        <p:spPr>
+          <a:xfrm>
+            <a:off x="4475825" y="1802167"/>
+            <a:ext cx="656947" cy="4296792"/>
+          </a:xfrm>
+          <a:prstGeom prst="rect">
+            <a:avLst/>
+          </a:prstGeom>
+        </p:spPr>
+        <p:style>
+          <a:lnRef idx="2">
+            <a:schemeClr val="accent1">
+              <a:shade val="50000"/>
+            </a:schemeClr>
+          </a:lnRef>
+          <a:fillRef idx="1">
+            <a:schemeClr val="accent1"/>
+          </a:fillRef>
+          <a:effectRef idx="0">
+            <a:schemeClr val="accent1"/>
+          </a:effectRef>
+          <a:fontRef idx="minor">
+            <a:schemeClr val="lt1"/>
+          </a:fontRef>
+        </p:style>
+        <p:txBody>
+          <a:bodyPr rtlCol="0" anchor="ctr"/>
+          <a:lstStyle/>
+          <a:p>
+            <a:pPr algn="ctr"/>
+            <a:endParaRPr lang="en-US"/>
+          </a:p>
+        </p:txBody>
+      </p:sp>
+      <p:sp>
+        <p:nvSpPr>
+          <p:cNvPr id="6" name="Rectangle 5"/>
+          <p:cNvSpPr/>
+          <p:nvPr/>
+        </p:nvSpPr>
+        <p:spPr>
+          <a:xfrm>
+            <a:off x="7344792" y="1802167"/>
+            <a:ext cx="656947" cy="4296792"/>
+          </a:xfrm>
+          <a:prstGeom prst="rect">
+            <a:avLst/>
+          </a:prstGeom>
+        </p:spPr>
+        <p:style>
+          <a:lnRef idx="2">
+            <a:schemeClr val="accent1">
+              <a:shade val="50000"/>
+            </a:schemeClr>
+          </a:lnRef>
+          <a:fillRef idx="1">
+            <a:schemeClr val="accent1"/>
+          </a:fillRef>
+          <a:effectRef idx="0">
+            <a:schemeClr val="accent1"/>
+          </a:effectRef>
+          <a:fontRef idx="minor">
+            <a:schemeClr val="lt1"/>
+          </a:fontRef>
+        </p:style>
+        <p:txBody>
+          <a:bodyPr rtlCol="0" anchor="ctr"/>
+          <a:lstStyle/>
+          <a:p>
+            <a:pPr algn="ctr"/>
+            <a:endParaRPr lang="en-US"/>
+          </a:p>
+        </p:txBody>
+      </p:sp>
+      <p:sp>
+        <p:nvSpPr>
+          <p:cNvPr id="7" name="TextBox 6"/>
+          <p:cNvSpPr txBox="1"/>
+          <p:nvPr/>
+        </p:nvSpPr>
+        <p:spPr>
+          <a:xfrm>
+            <a:off x="1890942" y="1349406"/>
+            <a:ext cx="625492" cy="369332"/>
+          </a:xfrm>
+          <a:prstGeom prst="rect">
+            <a:avLst/>
+          </a:prstGeom>
+          <a:noFill/>
+        </p:spPr>
+        <p:txBody>
+          <a:bodyPr wrap="none" rtlCol="0">
+            <a:spAutoFit/>
+          </a:bodyPr>
+          <a:lstStyle/>
+          <a:p>
+            <a:r>
+              <a:rPr lang="en-US" dirty="0" smtClean="0"/>
+              <a:t>User</a:t>
+            </a:r>
+            <a:endParaRPr lang="en-US" dirty="0"/>
+          </a:p>
+        </p:txBody>
+      </p:sp>
+      <p:sp>
+        <p:nvSpPr>
+          <p:cNvPr id="8" name="TextBox 7"/>
+          <p:cNvSpPr txBox="1"/>
+          <p:nvPr/>
+        </p:nvSpPr>
+        <p:spPr>
+          <a:xfrm>
+            <a:off x="4517201" y="1349406"/>
+            <a:ext cx="574196" cy="369332"/>
+          </a:xfrm>
+          <a:prstGeom prst="rect">
+            <a:avLst/>
+          </a:prstGeom>
+          <a:noFill/>
+        </p:spPr>
+        <p:txBody>
+          <a:bodyPr wrap="none" rtlCol="0">
+            <a:spAutoFit/>
+          </a:bodyPr>
+          <a:lstStyle/>
+          <a:p>
+            <a:pPr algn="ctr"/>
+            <a:r>
+              <a:rPr lang="en-US" dirty="0" smtClean="0"/>
+              <a:t>App</a:t>
+            </a:r>
+            <a:endParaRPr lang="en-US" dirty="0"/>
+          </a:p>
+        </p:txBody>
+      </p:sp>
+      <p:sp>
+        <p:nvSpPr>
+          <p:cNvPr id="9" name="TextBox 8"/>
+          <p:cNvSpPr txBox="1"/>
+          <p:nvPr/>
+        </p:nvSpPr>
+        <p:spPr>
+          <a:xfrm>
+            <a:off x="7435059" y="1317140"/>
+            <a:ext cx="476413" cy="369332"/>
+          </a:xfrm>
+          <a:prstGeom prst="rect">
+            <a:avLst/>
+          </a:prstGeom>
+          <a:noFill/>
+        </p:spPr>
+        <p:txBody>
+          <a:bodyPr wrap="none" rtlCol="0">
+            <a:spAutoFit/>
+          </a:bodyPr>
+          <a:lstStyle/>
+          <a:p>
+            <a:pPr algn="ctr"/>
+            <a:r>
+              <a:rPr lang="en-US" dirty="0" smtClean="0"/>
+              <a:t>DB</a:t>
+            </a:r>
+            <a:endParaRPr lang="en-US" dirty="0"/>
+          </a:p>
+        </p:txBody>
+      </p:sp>
+      <p:cxnSp>
+        <p:nvCxnSpPr>
+          <p:cNvPr id="11" name="Straight Arrow Connector 10"/>
+          <p:cNvCxnSpPr/>
+          <p:nvPr/>
+        </p:nvCxnSpPr>
+        <p:spPr>
+          <a:xfrm>
+            <a:off x="2516434" y="3096421"/>
+            <a:ext cx="1969311" cy="0"/>
+          </a:xfrm>
+          <a:prstGeom prst="straightConnector1">
+            <a:avLst/>
+          </a:prstGeom>
+          <a:ln>
+            <a:tailEnd type="arrow"/>
+          </a:ln>
+        </p:spPr>
+        <p:style>
+          <a:lnRef idx="1">
+            <a:schemeClr val="accent1"/>
+          </a:lnRef>
+          <a:fillRef idx="0">
+            <a:schemeClr val="accent1"/>
+          </a:fillRef>
+          <a:effectRef idx="0">
+            <a:schemeClr val="accent1"/>
+          </a:effectRef>
+          <a:fontRef idx="minor">
+            <a:schemeClr val="tx1"/>
+          </a:fontRef>
+        </p:style>
+      </p:cxnSp>
+      <p:sp>
+        <p:nvSpPr>
+          <p:cNvPr id="40" name="TextBox 39"/>
+          <p:cNvSpPr txBox="1"/>
+          <p:nvPr/>
+        </p:nvSpPr>
+        <p:spPr>
+          <a:xfrm>
+            <a:off x="2755535" y="2654017"/>
+            <a:ext cx="899605" cy="307777"/>
+          </a:xfrm>
+          <a:prstGeom prst="rect">
+            <a:avLst/>
+          </a:prstGeom>
+          <a:noFill/>
+        </p:spPr>
+        <p:txBody>
+          <a:bodyPr wrap="none" rtlCol="0">
+            <a:spAutoFit/>
+          </a:bodyPr>
+          <a:lstStyle/>
+          <a:p>
+            <a:r>
+              <a:rPr lang="en-US" sz="1400" dirty="0" smtClean="0"/>
+              <a:t>Input info</a:t>
+            </a:r>
+            <a:endParaRPr lang="en-US" sz="1400" dirty="0"/>
+          </a:p>
+        </p:txBody>
+      </p:sp>
+      <p:cxnSp>
+        <p:nvCxnSpPr>
+          <p:cNvPr id="44" name="Straight Arrow Connector 43"/>
+          <p:cNvCxnSpPr/>
+          <p:nvPr/>
+        </p:nvCxnSpPr>
+        <p:spPr>
+          <a:xfrm>
+            <a:off x="5123894" y="3244400"/>
+            <a:ext cx="2212020" cy="0"/>
+          </a:xfrm>
+          <a:prstGeom prst="straightConnector1">
+            <a:avLst/>
+          </a:prstGeom>
+          <a:ln>
+            <a:tailEnd type="arrow"/>
+          </a:ln>
+        </p:spPr>
+        <p:style>
+          <a:lnRef idx="1">
+            <a:schemeClr val="accent1"/>
+          </a:lnRef>
+          <a:fillRef idx="0">
+            <a:schemeClr val="accent1"/>
+          </a:fillRef>
+          <a:effectRef idx="0">
+            <a:schemeClr val="accent1"/>
+          </a:effectRef>
+          <a:fontRef idx="minor">
+            <a:schemeClr val="tx1"/>
+          </a:fontRef>
+        </p:style>
+      </p:cxnSp>
+      <p:sp>
+        <p:nvSpPr>
+          <p:cNvPr id="47" name="TextBox 46"/>
+          <p:cNvSpPr txBox="1"/>
+          <p:nvPr/>
+        </p:nvSpPr>
+        <p:spPr>
+          <a:xfrm>
+            <a:off x="5279384" y="2924943"/>
+            <a:ext cx="2152384" cy="307777"/>
+          </a:xfrm>
+          <a:prstGeom prst="rect">
+            <a:avLst/>
+          </a:prstGeom>
+          <a:noFill/>
+        </p:spPr>
+        <p:txBody>
+          <a:bodyPr wrap="none" rtlCol="0">
+            <a:spAutoFit/>
+          </a:bodyPr>
+          <a:lstStyle/>
+          <a:p>
+            <a:r>
+              <a:rPr lang="en-US" sz="1400" dirty="0" smtClean="0"/>
+              <a:t>Request User by username</a:t>
+            </a:r>
+            <a:endParaRPr lang="en-US" sz="1400" dirty="0"/>
+          </a:p>
+        </p:txBody>
+      </p:sp>
+      <p:cxnSp>
+        <p:nvCxnSpPr>
+          <p:cNvPr id="48" name="Straight Arrow Connector 47"/>
+          <p:cNvCxnSpPr/>
+          <p:nvPr/>
+        </p:nvCxnSpPr>
+        <p:spPr>
+          <a:xfrm flipH="1">
+            <a:off x="5132773" y="3710460"/>
+            <a:ext cx="2212019" cy="1"/>
+          </a:xfrm>
+          <a:prstGeom prst="straightConnector1">
+            <a:avLst/>
+          </a:prstGeom>
+          <a:ln>
+            <a:tailEnd type="arrow"/>
+          </a:ln>
+        </p:spPr>
+        <p:style>
+          <a:lnRef idx="1">
+            <a:schemeClr val="accent1"/>
+          </a:lnRef>
+          <a:fillRef idx="0">
+            <a:schemeClr val="accent1"/>
+          </a:fillRef>
+          <a:effectRef idx="0">
+            <a:schemeClr val="accent1"/>
+          </a:effectRef>
+          <a:fontRef idx="minor">
+            <a:schemeClr val="tx1"/>
+          </a:fontRef>
+        </p:style>
+      </p:cxnSp>
+      <p:sp>
+        <p:nvSpPr>
+          <p:cNvPr id="50" name="TextBox 49"/>
+          <p:cNvSpPr txBox="1"/>
+          <p:nvPr/>
+        </p:nvSpPr>
+        <p:spPr>
+          <a:xfrm>
+            <a:off x="5382556" y="3402683"/>
+            <a:ext cx="1684307" cy="307777"/>
+          </a:xfrm>
+          <a:prstGeom prst="rect">
+            <a:avLst/>
+          </a:prstGeom>
+          <a:noFill/>
+        </p:spPr>
+        <p:txBody>
+          <a:bodyPr wrap="none" rtlCol="0">
+            <a:spAutoFit/>
+          </a:bodyPr>
+          <a:lstStyle/>
+          <a:p>
+            <a:r>
+              <a:rPr lang="en-US" sz="1400" dirty="0" smtClean="0"/>
+              <a:t>Return Existing User</a:t>
+            </a:r>
+            <a:endParaRPr lang="en-US" sz="1400" dirty="0"/>
+          </a:p>
+        </p:txBody>
+      </p:sp>
+      <p:cxnSp>
+        <p:nvCxnSpPr>
+          <p:cNvPr id="51" name="Straight Arrow Connector 50"/>
+          <p:cNvCxnSpPr/>
+          <p:nvPr/>
+        </p:nvCxnSpPr>
+        <p:spPr>
+          <a:xfrm flipH="1" flipV="1">
+            <a:off x="2506513" y="3889340"/>
+            <a:ext cx="1969311" cy="17755"/>
+          </a:xfrm>
+          <a:prstGeom prst="straightConnector1">
+            <a:avLst/>
+          </a:prstGeom>
+          <a:ln>
+            <a:tailEnd type="arrow"/>
+          </a:ln>
+        </p:spPr>
+        <p:style>
+          <a:lnRef idx="1">
+            <a:schemeClr val="accent1"/>
+          </a:lnRef>
+          <a:fillRef idx="0">
+            <a:schemeClr val="accent1"/>
+          </a:fillRef>
+          <a:effectRef idx="0">
+            <a:schemeClr val="accent1"/>
+          </a:effectRef>
+          <a:fontRef idx="minor">
+            <a:schemeClr val="tx1"/>
+          </a:fontRef>
+        </p:style>
+      </p:cxnSp>
+      <p:sp>
+        <p:nvSpPr>
+          <p:cNvPr id="52" name="TextBox 51"/>
+          <p:cNvSpPr txBox="1"/>
+          <p:nvPr/>
+        </p:nvSpPr>
+        <p:spPr>
+          <a:xfrm>
+            <a:off x="2534705" y="3371340"/>
+            <a:ext cx="1941119" cy="523220"/>
+          </a:xfrm>
+          <a:prstGeom prst="rect">
+            <a:avLst/>
+          </a:prstGeom>
+          <a:noFill/>
+        </p:spPr>
+        <p:txBody>
+          <a:bodyPr wrap="square" rtlCol="0">
+            <a:spAutoFit/>
+          </a:bodyPr>
+          <a:lstStyle/>
+          <a:p>
+            <a:pPr algn="ctr"/>
+            <a:r>
+              <a:rPr lang="en-US" sz="1400" dirty="0" smtClean="0"/>
+              <a:t>Display </a:t>
+            </a:r>
+            <a:r>
+              <a:rPr lang="en-US" sz="1400" dirty="0" smtClean="0"/>
+              <a:t>Bad Username</a:t>
+            </a:r>
+          </a:p>
+          <a:p>
+            <a:pPr algn="ctr"/>
+            <a:r>
+              <a:rPr lang="en-US" sz="1400" dirty="0" smtClean="0"/>
+              <a:t>Error</a:t>
+            </a:r>
+            <a:endParaRPr lang="en-US" sz="1400" dirty="0"/>
           </a:p>
         </p:txBody>
       </p:sp>
     </p:spTree>
     <p:extLst>
       <p:ext uri="{BB962C8B-B14F-4D97-AF65-F5344CB8AC3E}">
-        <p14:creationId xmlns:p14="http://schemas.microsoft.com/office/powerpoint/2010/main" val="2917949882"/>
+        <p14:creationId xmlns:p14="http://schemas.microsoft.com/office/powerpoint/2010/main" val="1819544916"/>
       </p:ext>
     </p:extLst>
   </p:cSld>

</xml_diff>